<commit_message>
Update and Add new ppts
</commit_message>
<xml_diff>
--- a/(宣道詩113)在我心裡常吟讚美歌.pptx
+++ b/(宣道詩113)在我心裡常吟讚美歌.pptx
@@ -2,7 +2,7 @@
 <file path=ppt/presentation.xml><?xml version="1.0" encoding="utf-8"?>
 <p:presentation xmlns:a="http://schemas.openxmlformats.org/drawingml/2006/main" xmlns:r="http://schemas.openxmlformats.org/officeDocument/2006/relationships" xmlns:p="http://schemas.openxmlformats.org/presentationml/2006/main" saveSubsetFonts="1">
   <p:sldMasterIdLst>
-    <p:sldMasterId id="2147483648" r:id="rId1"/>
+    <p:sldMasterId id="2147483660" r:id="rId1"/>
   </p:sldMasterIdLst>
   <p:sldIdLst>
     <p:sldId id="256" r:id="rId2"/>
@@ -12,7 +12,7 @@
     <p:sldId id="260" r:id="rId6"/>
     <p:sldId id="261" r:id="rId7"/>
   </p:sldIdLst>
-  <p:sldSz cx="9144000" cy="6858000" type="screen4x3"/>
+  <p:sldSz cx="9144000" cy="5143500" type="screen16x9"/>
   <p:notesSz cx="6858000" cy="9144000"/>
   <p:defaultTextStyle>
     <a:defPPr>
@@ -141,8 +141,8 @@
         </p:nvSpPr>
         <p:spPr>
           <a:xfrm>
-            <a:off x="685800" y="2130425"/>
-            <a:ext cx="7772400" cy="1470025"/>
+            <a:off x="685800" y="1597819"/>
+            <a:ext cx="7772400" cy="1102519"/>
           </a:xfrm>
         </p:spPr>
         <p:txBody>
@@ -150,8 +150,8 @@
           <a:lstStyle/>
           <a:p>
             <a:r>
-              <a:rPr lang="zh-TW" altLang="en-US" smtClean="0"/>
-              <a:t>按一下以編輯母片標題樣式</a:t>
+              <a:rPr lang="en-US" altLang="zh-TW" smtClean="0"/>
+              <a:t>Click to edit Master title style</a:t>
             </a:r>
             <a:endParaRPr lang="zh-TW" altLang="en-US"/>
           </a:p>
@@ -169,8 +169,8 @@
         </p:nvSpPr>
         <p:spPr>
           <a:xfrm>
-            <a:off x="1371600" y="3886200"/>
-            <a:ext cx="6400800" cy="1752600"/>
+            <a:off x="1371600" y="2914650"/>
+            <a:ext cx="6400800" cy="1314450"/>
           </a:xfrm>
         </p:spPr>
         <p:txBody>
@@ -269,8 +269,8 @@
           </a:lstStyle>
           <a:p>
             <a:r>
-              <a:rPr lang="zh-TW" altLang="en-US" smtClean="0"/>
-              <a:t>按一下以編輯母片副標題樣式</a:t>
+              <a:rPr lang="en-US" altLang="zh-TW" smtClean="0"/>
+              <a:t>Click to edit Master subtitle style</a:t>
             </a:r>
             <a:endParaRPr lang="zh-TW" altLang="en-US"/>
           </a:p>
@@ -293,7 +293,7 @@
           <a:p>
             <a:fld id="{A2B5D7EE-74BC-4BDC-AE2A-3936D1310525}" type="datetimeFigureOut">
               <a:rPr lang="zh-TW" altLang="en-US" smtClean="0"/>
-              <a:t>2017/6/6</a:t>
+              <a:t>2019/8/3</a:t>
             </a:fld>
             <a:endParaRPr lang="zh-TW" altLang="en-US"/>
           </a:p>
@@ -382,8 +382,8 @@
           <a:lstStyle/>
           <a:p>
             <a:r>
-              <a:rPr lang="zh-TW" altLang="en-US" smtClean="0"/>
-              <a:t>按一下以編輯母片標題樣式</a:t>
+              <a:rPr lang="en-US" altLang="zh-TW" smtClean="0"/>
+              <a:t>Click to edit Master title style</a:t>
             </a:r>
             <a:endParaRPr lang="zh-TW" altLang="en-US"/>
           </a:p>
@@ -406,36 +406,36 @@
           <a:p>
             <a:pPr lvl="0"/>
             <a:r>
-              <a:rPr lang="zh-TW" altLang="en-US" smtClean="0"/>
-              <a:t>按一下以編輯母片文字樣式</a:t>
+              <a:rPr lang="en-US" altLang="zh-TW" smtClean="0"/>
+              <a:t>Click to edit Master text styles</a:t>
             </a:r>
           </a:p>
           <a:p>
             <a:pPr lvl="1"/>
             <a:r>
-              <a:rPr lang="zh-TW" altLang="en-US" smtClean="0"/>
-              <a:t>第二層</a:t>
+              <a:rPr lang="en-US" altLang="zh-TW" smtClean="0"/>
+              <a:t>Second level</a:t>
             </a:r>
           </a:p>
           <a:p>
             <a:pPr lvl="2"/>
             <a:r>
-              <a:rPr lang="zh-TW" altLang="en-US" smtClean="0"/>
-              <a:t>第三層</a:t>
+              <a:rPr lang="en-US" altLang="zh-TW" smtClean="0"/>
+              <a:t>Third level</a:t>
             </a:r>
           </a:p>
           <a:p>
             <a:pPr lvl="3"/>
             <a:r>
-              <a:rPr lang="zh-TW" altLang="en-US" smtClean="0"/>
-              <a:t>第四層</a:t>
+              <a:rPr lang="en-US" altLang="zh-TW" smtClean="0"/>
+              <a:t>Fourth level</a:t>
             </a:r>
           </a:p>
           <a:p>
             <a:pPr lvl="4"/>
             <a:r>
-              <a:rPr lang="zh-TW" altLang="en-US" smtClean="0"/>
-              <a:t>第五層</a:t>
+              <a:rPr lang="en-US" altLang="zh-TW" smtClean="0"/>
+              <a:t>Fifth level</a:t>
             </a:r>
             <a:endParaRPr lang="zh-TW" altLang="en-US"/>
           </a:p>
@@ -458,7 +458,7 @@
           <a:p>
             <a:fld id="{A2B5D7EE-74BC-4BDC-AE2A-3936D1310525}" type="datetimeFigureOut">
               <a:rPr lang="zh-TW" altLang="en-US" smtClean="0"/>
-              <a:t>2017/6/6</a:t>
+              <a:t>2019/8/3</a:t>
             </a:fld>
             <a:endParaRPr lang="zh-TW" altLang="en-US"/>
           </a:p>
@@ -543,8 +543,8 @@
         </p:nvSpPr>
         <p:spPr>
           <a:xfrm>
-            <a:off x="6629400" y="274638"/>
-            <a:ext cx="2057400" cy="5851525"/>
+            <a:off x="6629400" y="205979"/>
+            <a:ext cx="2057400" cy="4388644"/>
           </a:xfrm>
         </p:spPr>
         <p:txBody>
@@ -552,8 +552,8 @@
           <a:lstStyle/>
           <a:p>
             <a:r>
-              <a:rPr lang="zh-TW" altLang="en-US" smtClean="0"/>
-              <a:t>按一下以編輯母片標題樣式</a:t>
+              <a:rPr lang="en-US" altLang="zh-TW" smtClean="0"/>
+              <a:t>Click to edit Master title style</a:t>
             </a:r>
             <a:endParaRPr lang="zh-TW" altLang="en-US"/>
           </a:p>
@@ -571,8 +571,8 @@
         </p:nvSpPr>
         <p:spPr>
           <a:xfrm>
-            <a:off x="457200" y="274638"/>
-            <a:ext cx="6019800" cy="5851525"/>
+            <a:off x="457200" y="205979"/>
+            <a:ext cx="6019800" cy="4388644"/>
           </a:xfrm>
         </p:spPr>
         <p:txBody>
@@ -581,36 +581,36 @@
           <a:p>
             <a:pPr lvl="0"/>
             <a:r>
-              <a:rPr lang="zh-TW" altLang="en-US" smtClean="0"/>
-              <a:t>按一下以編輯母片文字樣式</a:t>
+              <a:rPr lang="en-US" altLang="zh-TW" smtClean="0"/>
+              <a:t>Click to edit Master text styles</a:t>
             </a:r>
           </a:p>
           <a:p>
             <a:pPr lvl="1"/>
             <a:r>
-              <a:rPr lang="zh-TW" altLang="en-US" smtClean="0"/>
-              <a:t>第二層</a:t>
+              <a:rPr lang="en-US" altLang="zh-TW" smtClean="0"/>
+              <a:t>Second level</a:t>
             </a:r>
           </a:p>
           <a:p>
             <a:pPr lvl="2"/>
             <a:r>
-              <a:rPr lang="zh-TW" altLang="en-US" smtClean="0"/>
-              <a:t>第三層</a:t>
+              <a:rPr lang="en-US" altLang="zh-TW" smtClean="0"/>
+              <a:t>Third level</a:t>
             </a:r>
           </a:p>
           <a:p>
             <a:pPr lvl="3"/>
             <a:r>
-              <a:rPr lang="zh-TW" altLang="en-US" smtClean="0"/>
-              <a:t>第四層</a:t>
+              <a:rPr lang="en-US" altLang="zh-TW" smtClean="0"/>
+              <a:t>Fourth level</a:t>
             </a:r>
           </a:p>
           <a:p>
             <a:pPr lvl="4"/>
             <a:r>
-              <a:rPr lang="zh-TW" altLang="en-US" smtClean="0"/>
-              <a:t>第五層</a:t>
+              <a:rPr lang="en-US" altLang="zh-TW" smtClean="0"/>
+              <a:t>Fifth level</a:t>
             </a:r>
             <a:endParaRPr lang="zh-TW" altLang="en-US"/>
           </a:p>
@@ -633,7 +633,7 @@
           <a:p>
             <a:fld id="{A2B5D7EE-74BC-4BDC-AE2A-3936D1310525}" type="datetimeFigureOut">
               <a:rPr lang="zh-TW" altLang="en-US" smtClean="0"/>
-              <a:t>2017/6/6</a:t>
+              <a:t>2019/8/3</a:t>
             </a:fld>
             <a:endParaRPr lang="zh-TW" altLang="en-US"/>
           </a:p>
@@ -722,8 +722,8 @@
           <a:lstStyle/>
           <a:p>
             <a:r>
-              <a:rPr lang="zh-TW" altLang="en-US" smtClean="0"/>
-              <a:t>按一下以編輯母片標題樣式</a:t>
+              <a:rPr lang="en-US" altLang="zh-TW" smtClean="0"/>
+              <a:t>Click to edit Master title style</a:t>
             </a:r>
             <a:endParaRPr lang="zh-TW" altLang="en-US"/>
           </a:p>
@@ -746,36 +746,36 @@
           <a:p>
             <a:pPr lvl="0"/>
             <a:r>
-              <a:rPr lang="zh-TW" altLang="en-US" smtClean="0"/>
-              <a:t>按一下以編輯母片文字樣式</a:t>
+              <a:rPr lang="en-US" altLang="zh-TW" smtClean="0"/>
+              <a:t>Click to edit Master text styles</a:t>
             </a:r>
           </a:p>
           <a:p>
             <a:pPr lvl="1"/>
             <a:r>
-              <a:rPr lang="zh-TW" altLang="en-US" smtClean="0"/>
-              <a:t>第二層</a:t>
+              <a:rPr lang="en-US" altLang="zh-TW" smtClean="0"/>
+              <a:t>Second level</a:t>
             </a:r>
           </a:p>
           <a:p>
             <a:pPr lvl="2"/>
             <a:r>
-              <a:rPr lang="zh-TW" altLang="en-US" smtClean="0"/>
-              <a:t>第三層</a:t>
+              <a:rPr lang="en-US" altLang="zh-TW" smtClean="0"/>
+              <a:t>Third level</a:t>
             </a:r>
           </a:p>
           <a:p>
             <a:pPr lvl="3"/>
             <a:r>
-              <a:rPr lang="zh-TW" altLang="en-US" smtClean="0"/>
-              <a:t>第四層</a:t>
+              <a:rPr lang="en-US" altLang="zh-TW" smtClean="0"/>
+              <a:t>Fourth level</a:t>
             </a:r>
           </a:p>
           <a:p>
             <a:pPr lvl="4"/>
             <a:r>
-              <a:rPr lang="zh-TW" altLang="en-US" smtClean="0"/>
-              <a:t>第五層</a:t>
+              <a:rPr lang="en-US" altLang="zh-TW" smtClean="0"/>
+              <a:t>Fifth level</a:t>
             </a:r>
             <a:endParaRPr lang="zh-TW" altLang="en-US"/>
           </a:p>
@@ -798,7 +798,7 @@
           <a:p>
             <a:fld id="{A2B5D7EE-74BC-4BDC-AE2A-3936D1310525}" type="datetimeFigureOut">
               <a:rPr lang="zh-TW" altLang="en-US" smtClean="0"/>
-              <a:t>2017/6/6</a:t>
+              <a:t>2019/8/3</a:t>
             </a:fld>
             <a:endParaRPr lang="zh-TW" altLang="en-US"/>
           </a:p>
@@ -883,8 +883,8 @@
         </p:nvSpPr>
         <p:spPr>
           <a:xfrm>
-            <a:off x="722313" y="4406900"/>
-            <a:ext cx="7772400" cy="1362075"/>
+            <a:off x="722313" y="3305176"/>
+            <a:ext cx="7772400" cy="1021556"/>
           </a:xfrm>
         </p:spPr>
         <p:txBody>
@@ -896,8 +896,8 @@
           </a:lstStyle>
           <a:p>
             <a:r>
-              <a:rPr lang="zh-TW" altLang="en-US" smtClean="0"/>
-              <a:t>按一下以編輯母片標題樣式</a:t>
+              <a:rPr lang="en-US" altLang="zh-TW" smtClean="0"/>
+              <a:t>Click to edit Master title style</a:t>
             </a:r>
             <a:endParaRPr lang="zh-TW" altLang="en-US"/>
           </a:p>
@@ -915,8 +915,8 @@
         </p:nvSpPr>
         <p:spPr>
           <a:xfrm>
-            <a:off x="722313" y="2906713"/>
-            <a:ext cx="7772400" cy="1500187"/>
+            <a:off x="722313" y="2180035"/>
+            <a:ext cx="7772400" cy="1125140"/>
           </a:xfrm>
         </p:spPr>
         <p:txBody>
@@ -1016,8 +1016,8 @@
           <a:p>
             <a:pPr lvl="0"/>
             <a:r>
-              <a:rPr lang="zh-TW" altLang="en-US" smtClean="0"/>
-              <a:t>按一下以編輯母片文字樣式</a:t>
+              <a:rPr lang="en-US" altLang="zh-TW" smtClean="0"/>
+              <a:t>Click to edit Master text styles</a:t>
             </a:r>
           </a:p>
         </p:txBody>
@@ -1039,7 +1039,7 @@
           <a:p>
             <a:fld id="{A2B5D7EE-74BC-4BDC-AE2A-3936D1310525}" type="datetimeFigureOut">
               <a:rPr lang="zh-TW" altLang="en-US" smtClean="0"/>
-              <a:t>2017/6/6</a:t>
+              <a:t>2019/8/3</a:t>
             </a:fld>
             <a:endParaRPr lang="zh-TW" altLang="en-US"/>
           </a:p>
@@ -1128,8 +1128,8 @@
           <a:lstStyle/>
           <a:p>
             <a:r>
-              <a:rPr lang="zh-TW" altLang="en-US" smtClean="0"/>
-              <a:t>按一下以編輯母片標題樣式</a:t>
+              <a:rPr lang="en-US" altLang="zh-TW" smtClean="0"/>
+              <a:t>Click to edit Master title style</a:t>
             </a:r>
             <a:endParaRPr lang="zh-TW" altLang="en-US"/>
           </a:p>
@@ -1147,8 +1147,8 @@
         </p:nvSpPr>
         <p:spPr>
           <a:xfrm>
-            <a:off x="457200" y="1600200"/>
-            <a:ext cx="4038600" cy="4525963"/>
+            <a:off x="457200" y="1200151"/>
+            <a:ext cx="4038600" cy="3394472"/>
           </a:xfrm>
         </p:spPr>
         <p:txBody>
@@ -1185,36 +1185,36 @@
           <a:p>
             <a:pPr lvl="0"/>
             <a:r>
-              <a:rPr lang="zh-TW" altLang="en-US" smtClean="0"/>
-              <a:t>按一下以編輯母片文字樣式</a:t>
+              <a:rPr lang="en-US" altLang="zh-TW" smtClean="0"/>
+              <a:t>Click to edit Master text styles</a:t>
             </a:r>
           </a:p>
           <a:p>
             <a:pPr lvl="1"/>
             <a:r>
-              <a:rPr lang="zh-TW" altLang="en-US" smtClean="0"/>
-              <a:t>第二層</a:t>
+              <a:rPr lang="en-US" altLang="zh-TW" smtClean="0"/>
+              <a:t>Second level</a:t>
             </a:r>
           </a:p>
           <a:p>
             <a:pPr lvl="2"/>
             <a:r>
-              <a:rPr lang="zh-TW" altLang="en-US" smtClean="0"/>
-              <a:t>第三層</a:t>
+              <a:rPr lang="en-US" altLang="zh-TW" smtClean="0"/>
+              <a:t>Third level</a:t>
             </a:r>
           </a:p>
           <a:p>
             <a:pPr lvl="3"/>
             <a:r>
-              <a:rPr lang="zh-TW" altLang="en-US" smtClean="0"/>
-              <a:t>第四層</a:t>
+              <a:rPr lang="en-US" altLang="zh-TW" smtClean="0"/>
+              <a:t>Fourth level</a:t>
             </a:r>
           </a:p>
           <a:p>
             <a:pPr lvl="4"/>
             <a:r>
-              <a:rPr lang="zh-TW" altLang="en-US" smtClean="0"/>
-              <a:t>第五層</a:t>
+              <a:rPr lang="en-US" altLang="zh-TW" smtClean="0"/>
+              <a:t>Fifth level</a:t>
             </a:r>
             <a:endParaRPr lang="zh-TW" altLang="en-US"/>
           </a:p>
@@ -1232,8 +1232,8 @@
         </p:nvSpPr>
         <p:spPr>
           <a:xfrm>
-            <a:off x="4648200" y="1600200"/>
-            <a:ext cx="4038600" cy="4525963"/>
+            <a:off x="4648200" y="1200151"/>
+            <a:ext cx="4038600" cy="3394472"/>
           </a:xfrm>
         </p:spPr>
         <p:txBody>
@@ -1270,36 +1270,36 @@
           <a:p>
             <a:pPr lvl="0"/>
             <a:r>
-              <a:rPr lang="zh-TW" altLang="en-US" smtClean="0"/>
-              <a:t>按一下以編輯母片文字樣式</a:t>
+              <a:rPr lang="en-US" altLang="zh-TW" smtClean="0"/>
+              <a:t>Click to edit Master text styles</a:t>
             </a:r>
           </a:p>
           <a:p>
             <a:pPr lvl="1"/>
             <a:r>
-              <a:rPr lang="zh-TW" altLang="en-US" smtClean="0"/>
-              <a:t>第二層</a:t>
+              <a:rPr lang="en-US" altLang="zh-TW" smtClean="0"/>
+              <a:t>Second level</a:t>
             </a:r>
           </a:p>
           <a:p>
             <a:pPr lvl="2"/>
             <a:r>
-              <a:rPr lang="zh-TW" altLang="en-US" smtClean="0"/>
-              <a:t>第三層</a:t>
+              <a:rPr lang="en-US" altLang="zh-TW" smtClean="0"/>
+              <a:t>Third level</a:t>
             </a:r>
           </a:p>
           <a:p>
             <a:pPr lvl="3"/>
             <a:r>
-              <a:rPr lang="zh-TW" altLang="en-US" smtClean="0"/>
-              <a:t>第四層</a:t>
+              <a:rPr lang="en-US" altLang="zh-TW" smtClean="0"/>
+              <a:t>Fourth level</a:t>
             </a:r>
           </a:p>
           <a:p>
             <a:pPr lvl="4"/>
             <a:r>
-              <a:rPr lang="zh-TW" altLang="en-US" smtClean="0"/>
-              <a:t>第五層</a:t>
+              <a:rPr lang="en-US" altLang="zh-TW" smtClean="0"/>
+              <a:t>Fifth level</a:t>
             </a:r>
             <a:endParaRPr lang="zh-TW" altLang="en-US"/>
           </a:p>
@@ -1322,7 +1322,7 @@
           <a:p>
             <a:fld id="{A2B5D7EE-74BC-4BDC-AE2A-3936D1310525}" type="datetimeFigureOut">
               <a:rPr lang="zh-TW" altLang="en-US" smtClean="0"/>
-              <a:t>2017/6/6</a:t>
+              <a:t>2019/8/3</a:t>
             </a:fld>
             <a:endParaRPr lang="zh-TW" altLang="en-US"/>
           </a:p>
@@ -1415,8 +1415,8 @@
           </a:lstStyle>
           <a:p>
             <a:r>
-              <a:rPr lang="zh-TW" altLang="en-US" smtClean="0"/>
-              <a:t>按一下以編輯母片標題樣式</a:t>
+              <a:rPr lang="en-US" altLang="zh-TW" smtClean="0"/>
+              <a:t>Click to edit Master title style</a:t>
             </a:r>
             <a:endParaRPr lang="zh-TW" altLang="en-US"/>
           </a:p>
@@ -1434,8 +1434,8 @@
         </p:nvSpPr>
         <p:spPr>
           <a:xfrm>
-            <a:off x="457200" y="1535113"/>
-            <a:ext cx="4040188" cy="639762"/>
+            <a:off x="457200" y="1151335"/>
+            <a:ext cx="4040188" cy="479822"/>
           </a:xfrm>
         </p:spPr>
         <p:txBody>
@@ -1481,8 +1481,8 @@
           <a:p>
             <a:pPr lvl="0"/>
             <a:r>
-              <a:rPr lang="zh-TW" altLang="en-US" smtClean="0"/>
-              <a:t>按一下以編輯母片文字樣式</a:t>
+              <a:rPr lang="en-US" altLang="zh-TW" smtClean="0"/>
+              <a:t>Click to edit Master text styles</a:t>
             </a:r>
           </a:p>
         </p:txBody>
@@ -1499,8 +1499,8 @@
         </p:nvSpPr>
         <p:spPr>
           <a:xfrm>
-            <a:off x="457200" y="2174875"/>
-            <a:ext cx="4040188" cy="3951288"/>
+            <a:off x="457200" y="1631156"/>
+            <a:ext cx="4040188" cy="2963466"/>
           </a:xfrm>
         </p:spPr>
         <p:txBody>
@@ -1537,36 +1537,36 @@
           <a:p>
             <a:pPr lvl="0"/>
             <a:r>
-              <a:rPr lang="zh-TW" altLang="en-US" smtClean="0"/>
-              <a:t>按一下以編輯母片文字樣式</a:t>
+              <a:rPr lang="en-US" altLang="zh-TW" smtClean="0"/>
+              <a:t>Click to edit Master text styles</a:t>
             </a:r>
           </a:p>
           <a:p>
             <a:pPr lvl="1"/>
             <a:r>
-              <a:rPr lang="zh-TW" altLang="en-US" smtClean="0"/>
-              <a:t>第二層</a:t>
+              <a:rPr lang="en-US" altLang="zh-TW" smtClean="0"/>
+              <a:t>Second level</a:t>
             </a:r>
           </a:p>
           <a:p>
             <a:pPr lvl="2"/>
             <a:r>
-              <a:rPr lang="zh-TW" altLang="en-US" smtClean="0"/>
-              <a:t>第三層</a:t>
+              <a:rPr lang="en-US" altLang="zh-TW" smtClean="0"/>
+              <a:t>Third level</a:t>
             </a:r>
           </a:p>
           <a:p>
             <a:pPr lvl="3"/>
             <a:r>
-              <a:rPr lang="zh-TW" altLang="en-US" smtClean="0"/>
-              <a:t>第四層</a:t>
+              <a:rPr lang="en-US" altLang="zh-TW" smtClean="0"/>
+              <a:t>Fourth level</a:t>
             </a:r>
           </a:p>
           <a:p>
             <a:pPr lvl="4"/>
             <a:r>
-              <a:rPr lang="zh-TW" altLang="en-US" smtClean="0"/>
-              <a:t>第五層</a:t>
+              <a:rPr lang="en-US" altLang="zh-TW" smtClean="0"/>
+              <a:t>Fifth level</a:t>
             </a:r>
             <a:endParaRPr lang="zh-TW" altLang="en-US"/>
           </a:p>
@@ -1584,8 +1584,8 @@
         </p:nvSpPr>
         <p:spPr>
           <a:xfrm>
-            <a:off x="4645025" y="1535113"/>
-            <a:ext cx="4041775" cy="639762"/>
+            <a:off x="4645026" y="1151335"/>
+            <a:ext cx="4041775" cy="479822"/>
           </a:xfrm>
         </p:spPr>
         <p:txBody>
@@ -1631,8 +1631,8 @@
           <a:p>
             <a:pPr lvl="0"/>
             <a:r>
-              <a:rPr lang="zh-TW" altLang="en-US" smtClean="0"/>
-              <a:t>按一下以編輯母片文字樣式</a:t>
+              <a:rPr lang="en-US" altLang="zh-TW" smtClean="0"/>
+              <a:t>Click to edit Master text styles</a:t>
             </a:r>
           </a:p>
         </p:txBody>
@@ -1649,8 +1649,8 @@
         </p:nvSpPr>
         <p:spPr>
           <a:xfrm>
-            <a:off x="4645025" y="2174875"/>
-            <a:ext cx="4041775" cy="3951288"/>
+            <a:off x="4645026" y="1631156"/>
+            <a:ext cx="4041775" cy="2963466"/>
           </a:xfrm>
         </p:spPr>
         <p:txBody>
@@ -1687,36 +1687,36 @@
           <a:p>
             <a:pPr lvl="0"/>
             <a:r>
-              <a:rPr lang="zh-TW" altLang="en-US" smtClean="0"/>
-              <a:t>按一下以編輯母片文字樣式</a:t>
+              <a:rPr lang="en-US" altLang="zh-TW" smtClean="0"/>
+              <a:t>Click to edit Master text styles</a:t>
             </a:r>
           </a:p>
           <a:p>
             <a:pPr lvl="1"/>
             <a:r>
-              <a:rPr lang="zh-TW" altLang="en-US" smtClean="0"/>
-              <a:t>第二層</a:t>
+              <a:rPr lang="en-US" altLang="zh-TW" smtClean="0"/>
+              <a:t>Second level</a:t>
             </a:r>
           </a:p>
           <a:p>
             <a:pPr lvl="2"/>
             <a:r>
-              <a:rPr lang="zh-TW" altLang="en-US" smtClean="0"/>
-              <a:t>第三層</a:t>
+              <a:rPr lang="en-US" altLang="zh-TW" smtClean="0"/>
+              <a:t>Third level</a:t>
             </a:r>
           </a:p>
           <a:p>
             <a:pPr lvl="3"/>
             <a:r>
-              <a:rPr lang="zh-TW" altLang="en-US" smtClean="0"/>
-              <a:t>第四層</a:t>
+              <a:rPr lang="en-US" altLang="zh-TW" smtClean="0"/>
+              <a:t>Fourth level</a:t>
             </a:r>
           </a:p>
           <a:p>
             <a:pPr lvl="4"/>
             <a:r>
-              <a:rPr lang="zh-TW" altLang="en-US" smtClean="0"/>
-              <a:t>第五層</a:t>
+              <a:rPr lang="en-US" altLang="zh-TW" smtClean="0"/>
+              <a:t>Fifth level</a:t>
             </a:r>
             <a:endParaRPr lang="zh-TW" altLang="en-US"/>
           </a:p>
@@ -1739,7 +1739,7 @@
           <a:p>
             <a:fld id="{A2B5D7EE-74BC-4BDC-AE2A-3936D1310525}" type="datetimeFigureOut">
               <a:rPr lang="zh-TW" altLang="en-US" smtClean="0"/>
-              <a:t>2017/6/6</a:t>
+              <a:t>2019/8/3</a:t>
             </a:fld>
             <a:endParaRPr lang="zh-TW" altLang="en-US"/>
           </a:p>
@@ -1828,8 +1828,8 @@
           <a:lstStyle/>
           <a:p>
             <a:r>
-              <a:rPr lang="zh-TW" altLang="en-US" smtClean="0"/>
-              <a:t>按一下以編輯母片標題樣式</a:t>
+              <a:rPr lang="en-US" altLang="zh-TW" smtClean="0"/>
+              <a:t>Click to edit Master title style</a:t>
             </a:r>
             <a:endParaRPr lang="zh-TW" altLang="en-US"/>
           </a:p>
@@ -1852,7 +1852,7 @@
           <a:p>
             <a:fld id="{A2B5D7EE-74BC-4BDC-AE2A-3936D1310525}" type="datetimeFigureOut">
               <a:rPr lang="zh-TW" altLang="en-US" smtClean="0"/>
-              <a:t>2017/6/6</a:t>
+              <a:t>2019/8/3</a:t>
             </a:fld>
             <a:endParaRPr lang="zh-TW" altLang="en-US"/>
           </a:p>
@@ -1942,7 +1942,7 @@
           <a:p>
             <a:fld id="{A2B5D7EE-74BC-4BDC-AE2A-3936D1310525}" type="datetimeFigureOut">
               <a:rPr lang="zh-TW" altLang="en-US" smtClean="0"/>
-              <a:t>2017/6/6</a:t>
+              <a:t>2019/8/3</a:t>
             </a:fld>
             <a:endParaRPr lang="zh-TW" altLang="en-US"/>
           </a:p>
@@ -2027,8 +2027,8 @@
         </p:nvSpPr>
         <p:spPr>
           <a:xfrm>
-            <a:off x="457200" y="273050"/>
-            <a:ext cx="3008313" cy="1162050"/>
+            <a:off x="457201" y="204787"/>
+            <a:ext cx="3008313" cy="871538"/>
           </a:xfrm>
         </p:spPr>
         <p:txBody>
@@ -2040,8 +2040,8 @@
           </a:lstStyle>
           <a:p>
             <a:r>
-              <a:rPr lang="zh-TW" altLang="en-US" smtClean="0"/>
-              <a:t>按一下以編輯母片標題樣式</a:t>
+              <a:rPr lang="en-US" altLang="zh-TW" smtClean="0"/>
+              <a:t>Click to edit Master title style</a:t>
             </a:r>
             <a:endParaRPr lang="zh-TW" altLang="en-US"/>
           </a:p>
@@ -2059,8 +2059,8 @@
         </p:nvSpPr>
         <p:spPr>
           <a:xfrm>
-            <a:off x="3575050" y="273050"/>
-            <a:ext cx="5111750" cy="5853113"/>
+            <a:off x="3575050" y="204788"/>
+            <a:ext cx="5111750" cy="4389835"/>
           </a:xfrm>
         </p:spPr>
         <p:txBody>
@@ -2097,36 +2097,36 @@
           <a:p>
             <a:pPr lvl="0"/>
             <a:r>
-              <a:rPr lang="zh-TW" altLang="en-US" smtClean="0"/>
-              <a:t>按一下以編輯母片文字樣式</a:t>
+              <a:rPr lang="en-US" altLang="zh-TW" smtClean="0"/>
+              <a:t>Click to edit Master text styles</a:t>
             </a:r>
           </a:p>
           <a:p>
             <a:pPr lvl="1"/>
             <a:r>
-              <a:rPr lang="zh-TW" altLang="en-US" smtClean="0"/>
-              <a:t>第二層</a:t>
+              <a:rPr lang="en-US" altLang="zh-TW" smtClean="0"/>
+              <a:t>Second level</a:t>
             </a:r>
           </a:p>
           <a:p>
             <a:pPr lvl="2"/>
             <a:r>
-              <a:rPr lang="zh-TW" altLang="en-US" smtClean="0"/>
-              <a:t>第三層</a:t>
+              <a:rPr lang="en-US" altLang="zh-TW" smtClean="0"/>
+              <a:t>Third level</a:t>
             </a:r>
           </a:p>
           <a:p>
             <a:pPr lvl="3"/>
             <a:r>
-              <a:rPr lang="zh-TW" altLang="en-US" smtClean="0"/>
-              <a:t>第四層</a:t>
+              <a:rPr lang="en-US" altLang="zh-TW" smtClean="0"/>
+              <a:t>Fourth level</a:t>
             </a:r>
           </a:p>
           <a:p>
             <a:pPr lvl="4"/>
             <a:r>
-              <a:rPr lang="zh-TW" altLang="en-US" smtClean="0"/>
-              <a:t>第五層</a:t>
+              <a:rPr lang="en-US" altLang="zh-TW" smtClean="0"/>
+              <a:t>Fifth level</a:t>
             </a:r>
             <a:endParaRPr lang="zh-TW" altLang="en-US"/>
           </a:p>
@@ -2144,8 +2144,8 @@
         </p:nvSpPr>
         <p:spPr>
           <a:xfrm>
-            <a:off x="457200" y="1435100"/>
-            <a:ext cx="3008313" cy="4691063"/>
+            <a:off x="457201" y="1076326"/>
+            <a:ext cx="3008313" cy="3518297"/>
           </a:xfrm>
         </p:spPr>
         <p:txBody>
@@ -2191,8 +2191,8 @@
           <a:p>
             <a:pPr lvl="0"/>
             <a:r>
-              <a:rPr lang="zh-TW" altLang="en-US" smtClean="0"/>
-              <a:t>按一下以編輯母片文字樣式</a:t>
+              <a:rPr lang="en-US" altLang="zh-TW" smtClean="0"/>
+              <a:t>Click to edit Master text styles</a:t>
             </a:r>
           </a:p>
         </p:txBody>
@@ -2214,7 +2214,7 @@
           <a:p>
             <a:fld id="{A2B5D7EE-74BC-4BDC-AE2A-3936D1310525}" type="datetimeFigureOut">
               <a:rPr lang="zh-TW" altLang="en-US" smtClean="0"/>
-              <a:t>2017/6/6</a:t>
+              <a:t>2019/8/3</a:t>
             </a:fld>
             <a:endParaRPr lang="zh-TW" altLang="en-US"/>
           </a:p>
@@ -2299,8 +2299,8 @@
         </p:nvSpPr>
         <p:spPr>
           <a:xfrm>
-            <a:off x="1792288" y="4800600"/>
-            <a:ext cx="5486400" cy="566738"/>
+            <a:off x="1792288" y="3600450"/>
+            <a:ext cx="5486400" cy="425054"/>
           </a:xfrm>
         </p:spPr>
         <p:txBody>
@@ -2312,8 +2312,8 @@
           </a:lstStyle>
           <a:p>
             <a:r>
-              <a:rPr lang="zh-TW" altLang="en-US" smtClean="0"/>
-              <a:t>按一下以編輯母片標題樣式</a:t>
+              <a:rPr lang="en-US" altLang="zh-TW" smtClean="0"/>
+              <a:t>Click to edit Master title style</a:t>
             </a:r>
             <a:endParaRPr lang="zh-TW" altLang="en-US"/>
           </a:p>
@@ -2331,8 +2331,8 @@
         </p:nvSpPr>
         <p:spPr>
           <a:xfrm>
-            <a:off x="1792288" y="612775"/>
-            <a:ext cx="5486400" cy="4114800"/>
+            <a:off x="1792288" y="459581"/>
+            <a:ext cx="5486400" cy="3086100"/>
           </a:xfrm>
         </p:spPr>
         <p:txBody>
@@ -2376,6 +2376,10 @@
             </a:lvl9pPr>
           </a:lstStyle>
           <a:p>
+            <a:r>
+              <a:rPr lang="en-US" altLang="zh-TW" smtClean="0"/>
+              <a:t>Click icon to add picture</a:t>
+            </a:r>
             <a:endParaRPr lang="zh-TW" altLang="en-US"/>
           </a:p>
         </p:txBody>
@@ -2392,8 +2396,8 @@
         </p:nvSpPr>
         <p:spPr>
           <a:xfrm>
-            <a:off x="1792288" y="5367338"/>
-            <a:ext cx="5486400" cy="804862"/>
+            <a:off x="1792288" y="4025503"/>
+            <a:ext cx="5486400" cy="603647"/>
           </a:xfrm>
         </p:spPr>
         <p:txBody>
@@ -2439,8 +2443,8 @@
           <a:p>
             <a:pPr lvl="0"/>
             <a:r>
-              <a:rPr lang="zh-TW" altLang="en-US" smtClean="0"/>
-              <a:t>按一下以編輯母片文字樣式</a:t>
+              <a:rPr lang="en-US" altLang="zh-TW" smtClean="0"/>
+              <a:t>Click to edit Master text styles</a:t>
             </a:r>
           </a:p>
         </p:txBody>
@@ -2462,7 +2466,7 @@
           <a:p>
             <a:fld id="{A2B5D7EE-74BC-4BDC-AE2A-3936D1310525}" type="datetimeFigureOut">
               <a:rPr lang="zh-TW" altLang="en-US" smtClean="0"/>
-              <a:t>2017/6/6</a:t>
+              <a:t>2019/8/3</a:t>
             </a:fld>
             <a:endParaRPr lang="zh-TW" altLang="en-US"/>
           </a:p>
@@ -2522,9 +2526,14 @@
 <p:sldMaster xmlns:a="http://schemas.openxmlformats.org/drawingml/2006/main" xmlns:r="http://schemas.openxmlformats.org/officeDocument/2006/relationships" xmlns:p="http://schemas.openxmlformats.org/presentationml/2006/main">
   <p:cSld>
     <p:bg>
-      <p:bgRef idx="1001">
-        <a:schemeClr val="bg1"/>
-      </p:bgRef>
+      <p:bgPr>
+        <a:blipFill dpi="0" rotWithShape="1">
+          <a:blip r:embed="rId13"/>
+          <a:srcRect/>
+          <a:tile tx="0" ty="0" sx="100000" sy="100000" flip="none" algn="tl"/>
+        </a:blipFill>
+        <a:effectLst/>
+      </p:bgPr>
     </p:bg>
     <p:spTree>
       <p:nvGrpSpPr>
@@ -2552,8 +2561,8 @@
         </p:nvSpPr>
         <p:spPr>
           <a:xfrm>
-            <a:off x="457200" y="274638"/>
-            <a:ext cx="8229600" cy="1143000"/>
+            <a:off x="457200" y="205979"/>
+            <a:ext cx="8229600" cy="857250"/>
           </a:xfrm>
           <a:prstGeom prst="rect">
             <a:avLst/>
@@ -2585,8 +2594,8 @@
         </p:nvSpPr>
         <p:spPr>
           <a:xfrm>
-            <a:off x="457200" y="1600200"/>
-            <a:ext cx="8229600" cy="4525963"/>
+            <a:off x="457200" y="1200151"/>
+            <a:ext cx="8229600" cy="3394472"/>
           </a:xfrm>
           <a:prstGeom prst="rect">
             <a:avLst/>
@@ -2647,8 +2656,8 @@
         </p:nvSpPr>
         <p:spPr>
           <a:xfrm>
-            <a:off x="457200" y="6356350"/>
-            <a:ext cx="2133600" cy="365125"/>
+            <a:off x="457200" y="4767263"/>
+            <a:ext cx="2133600" cy="273844"/>
           </a:xfrm>
           <a:prstGeom prst="rect">
             <a:avLst/>
@@ -2670,7 +2679,7 @@
           <a:p>
             <a:fld id="{A2B5D7EE-74BC-4BDC-AE2A-3936D1310525}" type="datetimeFigureOut">
               <a:rPr lang="zh-TW" altLang="en-US" smtClean="0"/>
-              <a:t>2017/6/6</a:t>
+              <a:t>2019/8/3</a:t>
             </a:fld>
             <a:endParaRPr lang="zh-TW" altLang="en-US"/>
           </a:p>
@@ -2688,8 +2697,8 @@
         </p:nvSpPr>
         <p:spPr>
           <a:xfrm>
-            <a:off x="3124200" y="6356350"/>
-            <a:ext cx="2895600" cy="365125"/>
+            <a:off x="3124200" y="4767263"/>
+            <a:ext cx="2895600" cy="273844"/>
           </a:xfrm>
           <a:prstGeom prst="rect">
             <a:avLst/>
@@ -2725,8 +2734,8 @@
         </p:nvSpPr>
         <p:spPr>
           <a:xfrm>
-            <a:off x="6553200" y="6356350"/>
-            <a:ext cx="2133600" cy="365125"/>
+            <a:off x="6553200" y="4767263"/>
+            <a:ext cx="2133600" cy="273844"/>
           </a:xfrm>
           <a:prstGeom prst="rect">
             <a:avLst/>
@@ -2758,17 +2767,17 @@
   </p:cSld>
   <p:clrMap bg1="lt1" tx1="dk1" bg2="lt2" tx2="dk2" accent1="accent1" accent2="accent2" accent3="accent3" accent4="accent4" accent5="accent5" accent6="accent6" hlink="hlink" folHlink="folHlink"/>
   <p:sldLayoutIdLst>
-    <p:sldLayoutId id="2147483649" r:id="rId1"/>
-    <p:sldLayoutId id="2147483650" r:id="rId2"/>
-    <p:sldLayoutId id="2147483651" r:id="rId3"/>
-    <p:sldLayoutId id="2147483652" r:id="rId4"/>
-    <p:sldLayoutId id="2147483653" r:id="rId5"/>
-    <p:sldLayoutId id="2147483654" r:id="rId6"/>
-    <p:sldLayoutId id="2147483655" r:id="rId7"/>
-    <p:sldLayoutId id="2147483656" r:id="rId8"/>
-    <p:sldLayoutId id="2147483657" r:id="rId9"/>
-    <p:sldLayoutId id="2147483658" r:id="rId10"/>
-    <p:sldLayoutId id="2147483659" r:id="rId11"/>
+    <p:sldLayoutId id="2147483661" r:id="rId1"/>
+    <p:sldLayoutId id="2147483662" r:id="rId2"/>
+    <p:sldLayoutId id="2147483663" r:id="rId3"/>
+    <p:sldLayoutId id="2147483664" r:id="rId4"/>
+    <p:sldLayoutId id="2147483665" r:id="rId5"/>
+    <p:sldLayoutId id="2147483666" r:id="rId6"/>
+    <p:sldLayoutId id="2147483667" r:id="rId7"/>
+    <p:sldLayoutId id="2147483668" r:id="rId8"/>
+    <p:sldLayoutId id="2147483669" r:id="rId9"/>
+    <p:sldLayoutId id="2147483670" r:id="rId10"/>
+    <p:sldLayoutId id="2147483671" r:id="rId11"/>
   </p:sldLayoutIdLst>
   <p:txStyles>
     <p:titleStyle>
@@ -3052,60 +3061,70 @@
         </p:nvSpPr>
         <p:spPr/>
         <p:txBody>
-          <a:bodyPr/>
-          <a:lstStyle/>
-          <a:p>
-            <a:r>
-              <a:rPr lang="zh-TW" altLang="en-US" b="1" dirty="0">
-                <a:solidFill>
-                  <a:srgbClr val="0070C0"/>
-                </a:solidFill>
-              </a:rPr>
-              <a:t>在我心裡常吟讚美歌</a:t>
-            </a:r>
-          </a:p>
-        </p:txBody>
-      </p:sp>
-      <p:sp>
-        <p:nvSpPr>
-          <p:cNvPr id="3" name="內容版面配置區 2"/>
-          <p:cNvSpPr>
-            <a:spLocks noGrp="1"/>
-          </p:cNvSpPr>
-          <p:nvPr>
-            <p:ph idx="1"/>
-          </p:nvPr>
-        </p:nvSpPr>
-        <p:spPr/>
-        <p:txBody>
-          <a:bodyPr anchor="ctr">
+          <a:bodyPr>
             <a:normAutofit/>
           </a:bodyPr>
           <a:lstStyle/>
           <a:p>
+            <a:r>
+              <a:rPr lang="zh-TW" altLang="en-US" sz="4000" b="1" dirty="0">
+                <a:solidFill>
+                  <a:srgbClr val="0070C0"/>
+                </a:solidFill>
+                <a:latin typeface="Microsoft JhengHei" pitchFamily="34" charset="-120"/>
+                <a:ea typeface="Microsoft JhengHei" pitchFamily="34" charset="-120"/>
+              </a:rPr>
+              <a:t>在我心裡常吟讚美歌</a:t>
+            </a:r>
+          </a:p>
+        </p:txBody>
+      </p:sp>
+      <p:sp>
+        <p:nvSpPr>
+          <p:cNvPr id="3" name="內容版面配置區 2"/>
+          <p:cNvSpPr>
+            <a:spLocks noGrp="1"/>
+          </p:cNvSpPr>
+          <p:nvPr>
+            <p:ph idx="1"/>
+          </p:nvPr>
+        </p:nvSpPr>
+        <p:spPr/>
+        <p:txBody>
+          <a:bodyPr anchor="ctr">
+            <a:noAutofit/>
+          </a:bodyPr>
+          <a:lstStyle/>
+          <a:p>
             <a:pPr algn="ctr">
               <a:buNone/>
             </a:pPr>
             <a:r>
-              <a:rPr lang="zh-TW" altLang="en-US" sz="5400" b="1" dirty="0">
-                <a:solidFill>
-                  <a:srgbClr val="0070C0"/>
-                </a:solidFill>
+              <a:rPr lang="zh-TW" altLang="en-US" sz="4800" b="1" dirty="0">
+                <a:solidFill>
+                  <a:srgbClr val="0070C0"/>
+                </a:solidFill>
+                <a:latin typeface="Microsoft JhengHei" pitchFamily="34" charset="-120"/>
+                <a:ea typeface="Microsoft JhengHei" pitchFamily="34" charset="-120"/>
               </a:rPr>
               <a:t>主耶穌賜我一首</a:t>
             </a:r>
             <a:r>
-              <a:rPr lang="zh-TW" altLang="en-US" sz="5400" b="1" dirty="0" smtClean="0">
-                <a:solidFill>
-                  <a:srgbClr val="0070C0"/>
-                </a:solidFill>
+              <a:rPr lang="zh-TW" altLang="en-US" sz="4800" b="1" dirty="0">
+                <a:solidFill>
+                  <a:srgbClr val="0070C0"/>
+                </a:solidFill>
+                <a:latin typeface="Microsoft JhengHei" pitchFamily="34" charset="-120"/>
+                <a:ea typeface="Microsoft JhengHei" pitchFamily="34" charset="-120"/>
               </a:rPr>
               <a:t>詩歌</a:t>
             </a:r>
-            <a:endParaRPr lang="en-US" altLang="zh-TW" sz="5400" b="1" dirty="0" smtClean="0">
+            <a:endParaRPr lang="en-US" altLang="zh-TW" sz="4800" b="1" dirty="0">
               <a:solidFill>
                 <a:srgbClr val="0070C0"/>
               </a:solidFill>
+              <a:latin typeface="Microsoft JhengHei" pitchFamily="34" charset="-120"/>
+              <a:ea typeface="Microsoft JhengHei" pitchFamily="34" charset="-120"/>
             </a:endParaRPr>
           </a:p>
           <a:p>
@@ -3113,33 +3132,41 @@
               <a:buNone/>
             </a:pPr>
             <a:r>
-              <a:rPr lang="zh-TW" altLang="en-US" sz="5400" b="1" dirty="0" smtClean="0">
-                <a:solidFill>
-                  <a:srgbClr val="0070C0"/>
-                </a:solidFill>
+              <a:rPr lang="zh-TW" altLang="en-US" sz="4800" b="1" dirty="0">
+                <a:solidFill>
+                  <a:srgbClr val="0070C0"/>
+                </a:solidFill>
+                <a:latin typeface="Microsoft JhengHei" pitchFamily="34" charset="-120"/>
+                <a:ea typeface="Microsoft JhengHei" pitchFamily="34" charset="-120"/>
               </a:rPr>
               <a:t>這</a:t>
             </a:r>
             <a:r>
-              <a:rPr lang="zh-TW" altLang="en-US" sz="5400" b="1" dirty="0">
-                <a:solidFill>
-                  <a:srgbClr val="0070C0"/>
-                </a:solidFill>
+              <a:rPr lang="zh-TW" altLang="en-US" sz="4800" b="1" dirty="0">
+                <a:solidFill>
+                  <a:srgbClr val="0070C0"/>
+                </a:solidFill>
+                <a:latin typeface="Microsoft JhengHei" pitchFamily="34" charset="-120"/>
+                <a:ea typeface="Microsoft JhengHei" pitchFamily="34" charset="-120"/>
               </a:rPr>
               <a:t>詩由天賜給</a:t>
             </a:r>
             <a:r>
-              <a:rPr lang="zh-TW" altLang="en-US" sz="5400" b="1" dirty="0" smtClean="0">
-                <a:solidFill>
-                  <a:srgbClr val="0070C0"/>
-                </a:solidFill>
+              <a:rPr lang="zh-TW" altLang="en-US" sz="4800" b="1" dirty="0">
+                <a:solidFill>
+                  <a:srgbClr val="0070C0"/>
+                </a:solidFill>
+                <a:latin typeface="Microsoft JhengHei" pitchFamily="34" charset="-120"/>
+                <a:ea typeface="Microsoft JhengHei" pitchFamily="34" charset="-120"/>
               </a:rPr>
               <a:t>我</a:t>
             </a:r>
-            <a:endParaRPr lang="en-US" altLang="zh-TW" sz="5400" b="1" dirty="0" smtClean="0">
+            <a:endParaRPr lang="en-US" altLang="zh-TW" sz="4800" b="1" dirty="0">
               <a:solidFill>
                 <a:srgbClr val="0070C0"/>
               </a:solidFill>
+              <a:latin typeface="Microsoft JhengHei" pitchFamily="34" charset="-120"/>
+              <a:ea typeface="Microsoft JhengHei" pitchFamily="34" charset="-120"/>
             </a:endParaRPr>
           </a:p>
           <a:p>
@@ -3147,33 +3174,41 @@
               <a:buNone/>
             </a:pPr>
             <a:r>
-              <a:rPr lang="zh-TW" altLang="en-US" sz="5400" b="1" dirty="0" smtClean="0">
-                <a:solidFill>
-                  <a:srgbClr val="0070C0"/>
-                </a:solidFill>
+              <a:rPr lang="zh-TW" altLang="en-US" sz="4800" b="1" dirty="0">
+                <a:solidFill>
+                  <a:srgbClr val="0070C0"/>
+                </a:solidFill>
+                <a:latin typeface="Microsoft JhengHei" pitchFamily="34" charset="-120"/>
+                <a:ea typeface="Microsoft JhengHei" pitchFamily="34" charset="-120"/>
               </a:rPr>
               <a:t> </a:t>
             </a:r>
             <a:r>
-              <a:rPr lang="zh-TW" altLang="en-US" sz="5400" b="1" dirty="0">
-                <a:solidFill>
-                  <a:srgbClr val="0070C0"/>
-                </a:solidFill>
+              <a:rPr lang="zh-TW" altLang="en-US" sz="4800" b="1" dirty="0">
+                <a:solidFill>
+                  <a:srgbClr val="0070C0"/>
+                </a:solidFill>
+                <a:latin typeface="Microsoft JhengHei" pitchFamily="34" charset="-120"/>
+                <a:ea typeface="Microsoft JhengHei" pitchFamily="34" charset="-120"/>
               </a:rPr>
               <a:t>從未有此美妙絕倫</a:t>
             </a:r>
             <a:r>
-              <a:rPr lang="zh-TW" altLang="en-US" sz="5400" b="1" dirty="0" smtClean="0">
-                <a:solidFill>
-                  <a:srgbClr val="0070C0"/>
-                </a:solidFill>
+              <a:rPr lang="zh-TW" altLang="en-US" sz="4800" b="1" dirty="0">
+                <a:solidFill>
+                  <a:srgbClr val="0070C0"/>
+                </a:solidFill>
+                <a:latin typeface="Microsoft JhengHei" pitchFamily="34" charset="-120"/>
+                <a:ea typeface="Microsoft JhengHei" pitchFamily="34" charset="-120"/>
               </a:rPr>
               <a:t>音樂</a:t>
             </a:r>
-            <a:endParaRPr lang="en-US" altLang="zh-TW" sz="5400" b="1" dirty="0" smtClean="0">
+            <a:endParaRPr lang="en-US" altLang="zh-TW" sz="4800" b="1" dirty="0">
               <a:solidFill>
                 <a:srgbClr val="0070C0"/>
               </a:solidFill>
+              <a:latin typeface="Microsoft JhengHei" pitchFamily="34" charset="-120"/>
+              <a:ea typeface="Microsoft JhengHei" pitchFamily="34" charset="-120"/>
             </a:endParaRPr>
           </a:p>
           <a:p>
@@ -3181,33 +3216,41 @@
               <a:buNone/>
             </a:pPr>
             <a:r>
-              <a:rPr lang="zh-TW" altLang="en-US" sz="5400" b="1" dirty="0" smtClean="0">
-                <a:solidFill>
-                  <a:srgbClr val="0070C0"/>
-                </a:solidFill>
+              <a:rPr lang="zh-TW" altLang="en-US" sz="4800" b="1" dirty="0">
+                <a:solidFill>
+                  <a:srgbClr val="0070C0"/>
+                </a:solidFill>
+                <a:latin typeface="Microsoft JhengHei" pitchFamily="34" charset="-120"/>
+                <a:ea typeface="Microsoft JhengHei" pitchFamily="34" charset="-120"/>
               </a:rPr>
               <a:t>真是</a:t>
             </a:r>
             <a:r>
-              <a:rPr lang="zh-TW" altLang="en-US" sz="5400" b="1" dirty="0">
-                <a:solidFill>
-                  <a:srgbClr val="0070C0"/>
-                </a:solidFill>
+              <a:rPr lang="zh-TW" altLang="en-US" sz="4800" b="1" dirty="0">
+                <a:solidFill>
+                  <a:srgbClr val="0070C0"/>
+                </a:solidFill>
+                <a:latin typeface="Microsoft JhengHei" pitchFamily="34" charset="-120"/>
+                <a:ea typeface="Microsoft JhengHei" pitchFamily="34" charset="-120"/>
               </a:rPr>
               <a:t>奇妙恩愛</a:t>
             </a:r>
             <a:r>
-              <a:rPr lang="zh-TW" altLang="en-US" sz="5400" b="1" dirty="0" smtClean="0">
-                <a:solidFill>
-                  <a:srgbClr val="0070C0"/>
-                </a:solidFill>
+              <a:rPr lang="zh-TW" altLang="en-US" sz="4800" b="1" dirty="0">
+                <a:solidFill>
+                  <a:srgbClr val="0070C0"/>
+                </a:solidFill>
+                <a:latin typeface="Microsoft JhengHei" pitchFamily="34" charset="-120"/>
+                <a:ea typeface="Microsoft JhengHei" pitchFamily="34" charset="-120"/>
               </a:rPr>
               <a:t>歌</a:t>
             </a:r>
-            <a:endParaRPr lang="zh-TW" altLang="en-US" sz="5400" b="1" dirty="0">
+            <a:endParaRPr lang="zh-TW" altLang="en-US" sz="4800" b="1" dirty="0">
               <a:solidFill>
                 <a:srgbClr val="0070C0"/>
               </a:solidFill>
+              <a:latin typeface="Microsoft JhengHei" pitchFamily="34" charset="-120"/>
+              <a:ea typeface="Microsoft JhengHei" pitchFamily="34" charset="-120"/>
             </a:endParaRPr>
           </a:p>
         </p:txBody>
@@ -3249,14 +3292,18 @@
         </p:nvSpPr>
         <p:spPr/>
         <p:txBody>
-          <a:bodyPr/>
-          <a:lstStyle/>
-          <a:p>
-            <a:r>
-              <a:rPr lang="zh-TW" altLang="en-US" b="1" dirty="0">
-                <a:solidFill>
-                  <a:srgbClr val="0070C0"/>
-                </a:solidFill>
+          <a:bodyPr>
+            <a:normAutofit/>
+          </a:bodyPr>
+          <a:lstStyle/>
+          <a:p>
+            <a:r>
+              <a:rPr lang="zh-TW" altLang="en-US" sz="4000" b="1" dirty="0">
+                <a:solidFill>
+                  <a:srgbClr val="0070C0"/>
+                </a:solidFill>
+                <a:latin typeface="Microsoft JhengHei" pitchFamily="34" charset="-120"/>
+                <a:ea typeface="Microsoft JhengHei" pitchFamily="34" charset="-120"/>
               </a:rPr>
               <a:t>在我心裡常吟讚美歌</a:t>
             </a:r>
@@ -3275,8 +3322,8 @@
         </p:nvSpPr>
         <p:spPr>
           <a:xfrm>
-            <a:off x="457200" y="1600200"/>
-            <a:ext cx="8229600" cy="4900634"/>
+            <a:off x="0" y="1200150"/>
+            <a:ext cx="9144000" cy="3675476"/>
           </a:xfrm>
         </p:spPr>
         <p:txBody>
@@ -3289,25 +3336,31 @@
               <a:buNone/>
             </a:pPr>
             <a:r>
-              <a:rPr lang="zh-TW" altLang="en-US" sz="5400" b="1" dirty="0">
-                <a:solidFill>
-                  <a:srgbClr val="0070C0"/>
-                </a:solidFill>
+              <a:rPr lang="zh-TW" altLang="en-US" sz="4800" b="1" dirty="0">
+                <a:solidFill>
+                  <a:srgbClr val="0070C0"/>
+                </a:solidFill>
+                <a:latin typeface="Microsoft JhengHei" pitchFamily="34" charset="-120"/>
+                <a:ea typeface="Microsoft JhengHei" pitchFamily="34" charset="-120"/>
               </a:rPr>
               <a:t>在我心裡常吟</a:t>
             </a:r>
             <a:r>
-              <a:rPr lang="zh-TW" altLang="en-US" sz="5400" b="1" dirty="0" smtClean="0">
-                <a:solidFill>
-                  <a:srgbClr val="0070C0"/>
-                </a:solidFill>
+              <a:rPr lang="zh-TW" altLang="en-US" sz="4800" b="1" dirty="0" smtClean="0">
+                <a:solidFill>
+                  <a:srgbClr val="0070C0"/>
+                </a:solidFill>
+                <a:latin typeface="Microsoft JhengHei" pitchFamily="34" charset="-120"/>
+                <a:ea typeface="Microsoft JhengHei" pitchFamily="34" charset="-120"/>
               </a:rPr>
               <a:t>讚美</a:t>
             </a:r>
-            <a:endParaRPr lang="en-US" altLang="zh-TW" sz="5400" b="1" dirty="0" smtClean="0">
+            <a:endParaRPr lang="en-US" altLang="zh-TW" sz="4800" b="1" dirty="0" smtClean="0">
               <a:solidFill>
                 <a:srgbClr val="0070C0"/>
               </a:solidFill>
+              <a:latin typeface="Microsoft JhengHei" pitchFamily="34" charset="-120"/>
+              <a:ea typeface="Microsoft JhengHei" pitchFamily="34" charset="-120"/>
             </a:endParaRPr>
           </a:p>
           <a:p>
@@ -3315,41 +3368,91 @@
               <a:buNone/>
             </a:pPr>
             <a:r>
-              <a:rPr lang="zh-TW" altLang="en-US" sz="5400" b="1" dirty="0" smtClean="0">
-                <a:solidFill>
-                  <a:srgbClr val="0070C0"/>
-                </a:solidFill>
+              <a:rPr lang="zh-TW" altLang="en-US" sz="4800" b="1" dirty="0" smtClean="0">
+                <a:solidFill>
+                  <a:srgbClr val="0070C0"/>
+                </a:solidFill>
+                <a:latin typeface="Microsoft JhengHei" pitchFamily="34" charset="-120"/>
+                <a:ea typeface="Microsoft JhengHei" pitchFamily="34" charset="-120"/>
               </a:rPr>
               <a:t>歌時常</a:t>
             </a:r>
             <a:r>
-              <a:rPr lang="zh-TW" altLang="en-US" sz="5400" b="1" dirty="0">
-                <a:solidFill>
-                  <a:srgbClr val="0070C0"/>
-                </a:solidFill>
+              <a:rPr lang="zh-TW" altLang="en-US" sz="4800" b="1" dirty="0">
+                <a:solidFill>
+                  <a:srgbClr val="0070C0"/>
+                </a:solidFill>
+                <a:latin typeface="Microsoft JhengHei" pitchFamily="34" charset="-120"/>
+                <a:ea typeface="Microsoft JhengHei" pitchFamily="34" charset="-120"/>
               </a:rPr>
               <a:t>吟奇妙</a:t>
             </a:r>
             <a:r>
-              <a:rPr lang="zh-TW" altLang="en-US" sz="5400" b="1" dirty="0" smtClean="0">
-                <a:solidFill>
-                  <a:srgbClr val="0070C0"/>
-                </a:solidFill>
+              <a:rPr lang="zh-TW" altLang="en-US" sz="4800" b="1" dirty="0" smtClean="0">
+                <a:solidFill>
+                  <a:srgbClr val="0070C0"/>
+                </a:solidFill>
+                <a:latin typeface="Microsoft JhengHei" pitchFamily="34" charset="-120"/>
+                <a:ea typeface="Microsoft JhengHei" pitchFamily="34" charset="-120"/>
               </a:rPr>
               <a:t>歌</a:t>
             </a:r>
             <a:r>
-              <a:rPr lang="zh-TW" altLang="en-US" sz="5400" b="1" dirty="0">
-                <a:solidFill>
-                  <a:srgbClr val="0070C0"/>
-                </a:solidFill>
-              </a:rPr>
-              <a:t>　　　</a:t>
-            </a:r>
-            <a:endParaRPr lang="en-US" altLang="zh-TW" sz="5400" b="1" dirty="0" smtClean="0">
+              <a:rPr lang="zh-TW" altLang="en-US" sz="4800" b="1" dirty="0">
+                <a:solidFill>
+                  <a:srgbClr val="0070C0"/>
+                </a:solidFill>
+                <a:latin typeface="Microsoft JhengHei" pitchFamily="34" charset="-120"/>
+                <a:ea typeface="Microsoft JhengHei" pitchFamily="34" charset="-120"/>
+              </a:rPr>
+              <a:t> </a:t>
+            </a:r>
+            <a:r>
+              <a:rPr lang="zh-TW" altLang="en-US" sz="4800" b="1" dirty="0" smtClean="0">
+                <a:solidFill>
+                  <a:srgbClr val="0070C0"/>
+                </a:solidFill>
+                <a:latin typeface="Microsoft JhengHei" pitchFamily="34" charset="-120"/>
+                <a:ea typeface="Microsoft JhengHei" pitchFamily="34" charset="-120"/>
+              </a:rPr>
+              <a:t> </a:t>
+            </a:r>
+            <a:r>
+              <a:rPr lang="zh-TW" altLang="en-US" sz="4800" b="1" dirty="0" smtClean="0">
+                <a:solidFill>
+                  <a:srgbClr val="0070C0"/>
+                </a:solidFill>
+                <a:latin typeface="Microsoft JhengHei" pitchFamily="34" charset="-120"/>
+                <a:ea typeface="Microsoft JhengHei" pitchFamily="34" charset="-120"/>
+              </a:rPr>
+              <a:t>像</a:t>
+            </a:r>
+            <a:r>
+              <a:rPr lang="zh-TW" altLang="en-US" sz="4800" b="1" dirty="0">
+                <a:solidFill>
+                  <a:srgbClr val="0070C0"/>
+                </a:solidFill>
+                <a:latin typeface="Microsoft JhengHei" pitchFamily="34" charset="-120"/>
+                <a:ea typeface="Microsoft JhengHei" pitchFamily="34" charset="-120"/>
+              </a:rPr>
+              <a:t>天使同</a:t>
+            </a:r>
+            <a:r>
+              <a:rPr lang="zh-TW" altLang="en-US" sz="4800" b="1" dirty="0" smtClean="0">
+                <a:solidFill>
+                  <a:srgbClr val="0070C0"/>
+                </a:solidFill>
+                <a:latin typeface="Microsoft JhengHei" pitchFamily="34" charset="-120"/>
+                <a:ea typeface="Microsoft JhengHei" pitchFamily="34" charset="-120"/>
+              </a:rPr>
+              <a:t>唱和</a:t>
+            </a:r>
+            <a:endParaRPr lang="en-US" altLang="zh-TW" sz="4800" b="1" dirty="0" smtClean="0">
               <a:solidFill>
                 <a:srgbClr val="0070C0"/>
               </a:solidFill>
+              <a:latin typeface="Microsoft JhengHei" pitchFamily="34" charset="-120"/>
+              <a:ea typeface="Microsoft JhengHei" pitchFamily="34" charset="-120"/>
             </a:endParaRPr>
           </a:p>
           <a:p>
@@ -3357,33 +3460,61 @@
               <a:buNone/>
             </a:pPr>
             <a:r>
-              <a:rPr lang="zh-TW" altLang="en-US" sz="5400" b="1" dirty="0" smtClean="0">
-                <a:solidFill>
-                  <a:srgbClr val="0070C0"/>
-                </a:solidFill>
-              </a:rPr>
-              <a:t>像</a:t>
-            </a:r>
-            <a:r>
-              <a:rPr lang="zh-TW" altLang="en-US" sz="5400" b="1" dirty="0">
-                <a:solidFill>
-                  <a:srgbClr val="0070C0"/>
-                </a:solidFill>
-              </a:rPr>
-              <a:t>天使同</a:t>
-            </a:r>
-            <a:r>
-              <a:rPr lang="zh-TW" altLang="en-US" sz="5400" b="1" dirty="0" smtClean="0">
-                <a:solidFill>
-                  <a:srgbClr val="0070C0"/>
-                </a:solidFill>
-              </a:rPr>
-              <a:t>唱和</a:t>
-            </a:r>
-            <a:endParaRPr lang="en-US" altLang="zh-TW" sz="5400" b="1" dirty="0" smtClean="0">
+              <a:rPr lang="zh-TW" altLang="en-US" sz="4800" b="1" dirty="0" smtClean="0">
+                <a:solidFill>
+                  <a:srgbClr val="0070C0"/>
+                </a:solidFill>
+                <a:latin typeface="Microsoft JhengHei" pitchFamily="34" charset="-120"/>
+                <a:ea typeface="Microsoft JhengHei" pitchFamily="34" charset="-120"/>
+              </a:rPr>
+              <a:t>在</a:t>
+            </a:r>
+            <a:r>
+              <a:rPr lang="zh-TW" altLang="en-US" sz="4800" b="1" dirty="0">
+                <a:solidFill>
+                  <a:srgbClr val="0070C0"/>
+                </a:solidFill>
+                <a:latin typeface="Microsoft JhengHei" pitchFamily="34" charset="-120"/>
+                <a:ea typeface="Microsoft JhengHei" pitchFamily="34" charset="-120"/>
+              </a:rPr>
+              <a:t>我</a:t>
+            </a:r>
+            <a:r>
+              <a:rPr lang="zh-TW" altLang="en-US" sz="4800" b="1" dirty="0" smtClean="0">
+                <a:solidFill>
+                  <a:srgbClr val="0070C0"/>
+                </a:solidFill>
+                <a:latin typeface="Microsoft JhengHei" pitchFamily="34" charset="-120"/>
+                <a:ea typeface="Microsoft JhengHei" pitchFamily="34" charset="-120"/>
+              </a:rPr>
+              <a:t>心裡常</a:t>
+            </a:r>
+            <a:r>
+              <a:rPr lang="zh-TW" altLang="en-US" sz="4800" b="1" dirty="0">
+                <a:solidFill>
+                  <a:srgbClr val="0070C0"/>
+                </a:solidFill>
+                <a:latin typeface="Microsoft JhengHei" pitchFamily="34" charset="-120"/>
+                <a:ea typeface="Microsoft JhengHei" pitchFamily="34" charset="-120"/>
+              </a:rPr>
+              <a:t>吟</a:t>
+            </a:r>
+            <a:r>
+              <a:rPr lang="zh-TW" altLang="en-US" sz="4800" b="1" dirty="0" smtClean="0">
+                <a:solidFill>
+                  <a:srgbClr val="0070C0"/>
+                </a:solidFill>
+                <a:latin typeface="Microsoft JhengHei" pitchFamily="34" charset="-120"/>
+                <a:ea typeface="Microsoft JhengHei" pitchFamily="34" charset="-120"/>
+              </a:rPr>
+              <a:t>讚美</a:t>
+            </a:r>
+            <a:endParaRPr lang="en-US" altLang="zh-TW" sz="4800" b="1" dirty="0" smtClean="0">
               <a:solidFill>
                 <a:srgbClr val="0070C0"/>
               </a:solidFill>
+              <a:latin typeface="Microsoft JhengHei" pitchFamily="34" charset="-120"/>
+              <a:ea typeface="Microsoft JhengHei" pitchFamily="34" charset="-120"/>
             </a:endParaRPr>
           </a:p>
           <a:p>
@@ -3391,67 +3522,21 @@
               <a:buNone/>
             </a:pPr>
             <a:r>
-              <a:rPr lang="zh-TW" altLang="en-US" sz="5400" b="1" dirty="0" smtClean="0">
-                <a:solidFill>
-                  <a:srgbClr val="0070C0"/>
-                </a:solidFill>
-              </a:rPr>
-              <a:t>在</a:t>
-            </a:r>
-            <a:r>
-              <a:rPr lang="zh-TW" altLang="en-US" sz="5400" b="1" dirty="0">
-                <a:solidFill>
-                  <a:srgbClr val="0070C0"/>
-                </a:solidFill>
-              </a:rPr>
-              <a:t>我</a:t>
-            </a:r>
-            <a:r>
-              <a:rPr lang="zh-TW" altLang="en-US" sz="5400" b="1" dirty="0" smtClean="0">
-                <a:solidFill>
-                  <a:srgbClr val="0070C0"/>
-                </a:solidFill>
-              </a:rPr>
-              <a:t>心裡常</a:t>
-            </a:r>
-            <a:r>
-              <a:rPr lang="zh-TW" altLang="en-US" sz="5400" b="1" dirty="0">
-                <a:solidFill>
-                  <a:srgbClr val="0070C0"/>
-                </a:solidFill>
-              </a:rPr>
-              <a:t>吟</a:t>
-            </a:r>
-            <a:r>
-              <a:rPr lang="zh-TW" altLang="en-US" sz="5400" b="1" dirty="0" smtClean="0">
-                <a:solidFill>
-                  <a:srgbClr val="0070C0"/>
-                </a:solidFill>
-              </a:rPr>
-              <a:t>讚美</a:t>
-            </a:r>
-            <a:endParaRPr lang="en-US" altLang="zh-TW" sz="5400" b="1" dirty="0" smtClean="0">
+              <a:rPr lang="zh-TW" altLang="en-US" sz="4800" b="1" dirty="0" smtClean="0">
+                <a:solidFill>
+                  <a:srgbClr val="0070C0"/>
+                </a:solidFill>
+                <a:latin typeface="Microsoft JhengHei" pitchFamily="34" charset="-120"/>
+                <a:ea typeface="Microsoft JhengHei" pitchFamily="34" charset="-120"/>
+              </a:rPr>
+              <a:t>歌時常吟奇妙恩愛歌</a:t>
+            </a:r>
+            <a:endParaRPr lang="zh-TW" altLang="en-US" sz="4800" b="1" dirty="0">
               <a:solidFill>
                 <a:srgbClr val="0070C0"/>
               </a:solidFill>
-            </a:endParaRPr>
-          </a:p>
-          <a:p>
-            <a:pPr algn="ctr">
-              <a:buNone/>
-            </a:pPr>
-            <a:r>
-              <a:rPr lang="zh-TW" altLang="en-US" sz="5400" b="1" dirty="0" smtClean="0">
-                <a:solidFill>
-                  <a:srgbClr val="0070C0"/>
-                </a:solidFill>
-              </a:rPr>
-              <a:t>歌時常吟奇妙恩愛歌</a:t>
-            </a:r>
-            <a:endParaRPr lang="zh-TW" altLang="en-US" sz="5400" b="1" dirty="0">
-              <a:solidFill>
-                <a:srgbClr val="0070C0"/>
-              </a:solidFill>
+              <a:latin typeface="Microsoft JhengHei" pitchFamily="34" charset="-120"/>
+              <a:ea typeface="Microsoft JhengHei" pitchFamily="34" charset="-120"/>
             </a:endParaRPr>
           </a:p>
         </p:txBody>
@@ -3493,60 +3578,70 @@
         </p:nvSpPr>
         <p:spPr/>
         <p:txBody>
-          <a:bodyPr/>
-          <a:lstStyle/>
-          <a:p>
-            <a:r>
-              <a:rPr lang="zh-TW" altLang="en-US" b="1" dirty="0">
-                <a:solidFill>
-                  <a:srgbClr val="0070C0"/>
-                </a:solidFill>
-              </a:rPr>
-              <a:t>在我心裡常吟讚美歌</a:t>
-            </a:r>
-          </a:p>
-        </p:txBody>
-      </p:sp>
-      <p:sp>
-        <p:nvSpPr>
-          <p:cNvPr id="3" name="內容版面配置區 2"/>
-          <p:cNvSpPr>
-            <a:spLocks noGrp="1"/>
-          </p:cNvSpPr>
-          <p:nvPr>
-            <p:ph idx="1"/>
-          </p:nvPr>
-        </p:nvSpPr>
-        <p:spPr/>
-        <p:txBody>
-          <a:bodyPr anchor="ctr">
+          <a:bodyPr>
             <a:normAutofit/>
           </a:bodyPr>
           <a:lstStyle/>
           <a:p>
+            <a:r>
+              <a:rPr lang="zh-TW" altLang="en-US" sz="4000" b="1" dirty="0">
+                <a:solidFill>
+                  <a:srgbClr val="0070C0"/>
+                </a:solidFill>
+                <a:latin typeface="Microsoft JhengHei" pitchFamily="34" charset="-120"/>
+                <a:ea typeface="Microsoft JhengHei" pitchFamily="34" charset="-120"/>
+              </a:rPr>
+              <a:t>在我心裡常吟讚美歌</a:t>
+            </a:r>
+          </a:p>
+        </p:txBody>
+      </p:sp>
+      <p:sp>
+        <p:nvSpPr>
+          <p:cNvPr id="3" name="內容版面配置區 2"/>
+          <p:cNvSpPr>
+            <a:spLocks noGrp="1"/>
+          </p:cNvSpPr>
+          <p:nvPr>
+            <p:ph idx="1"/>
+          </p:nvPr>
+        </p:nvSpPr>
+        <p:spPr/>
+        <p:txBody>
+          <a:bodyPr anchor="ctr">
+            <a:noAutofit/>
+          </a:bodyPr>
+          <a:lstStyle/>
+          <a:p>
             <a:pPr algn="ctr">
               <a:buNone/>
             </a:pPr>
             <a:r>
-              <a:rPr lang="zh-TW" altLang="en-US" sz="5400" b="1" dirty="0">
-                <a:solidFill>
-                  <a:srgbClr val="0070C0"/>
-                </a:solidFill>
+              <a:rPr lang="zh-TW" altLang="en-US" sz="4800" b="1" dirty="0">
+                <a:solidFill>
+                  <a:srgbClr val="0070C0"/>
+                </a:solidFill>
+                <a:latin typeface="Microsoft JhengHei" pitchFamily="34" charset="-120"/>
+                <a:ea typeface="Microsoft JhengHei" pitchFamily="34" charset="-120"/>
               </a:rPr>
               <a:t>我愛耶穌因祂為我</a:t>
             </a:r>
             <a:r>
-              <a:rPr lang="zh-TW" altLang="en-US" sz="5400" b="1" dirty="0" smtClean="0">
-                <a:solidFill>
-                  <a:srgbClr val="0070C0"/>
-                </a:solidFill>
+              <a:rPr lang="zh-TW" altLang="en-US" sz="4800" b="1" dirty="0">
+                <a:solidFill>
+                  <a:srgbClr val="0070C0"/>
+                </a:solidFill>
+                <a:latin typeface="Microsoft JhengHei" pitchFamily="34" charset="-120"/>
+                <a:ea typeface="Microsoft JhengHei" pitchFamily="34" charset="-120"/>
               </a:rPr>
               <a:t>死</a:t>
             </a:r>
-            <a:endParaRPr lang="en-US" altLang="zh-TW" sz="5400" b="1" dirty="0" smtClean="0">
+            <a:endParaRPr lang="en-US" altLang="zh-TW" sz="4800" b="1" dirty="0">
               <a:solidFill>
                 <a:srgbClr val="0070C0"/>
               </a:solidFill>
+              <a:latin typeface="Microsoft JhengHei" pitchFamily="34" charset="-120"/>
+              <a:ea typeface="Microsoft JhengHei" pitchFamily="34" charset="-120"/>
             </a:endParaRPr>
           </a:p>
           <a:p>
@@ -3554,33 +3649,41 @@
               <a:buNone/>
             </a:pPr>
             <a:r>
-              <a:rPr lang="zh-TW" altLang="en-US" sz="5400" b="1" dirty="0" smtClean="0">
-                <a:solidFill>
-                  <a:srgbClr val="0070C0"/>
-                </a:solidFill>
+              <a:rPr lang="zh-TW" altLang="en-US" sz="4800" b="1" dirty="0">
+                <a:solidFill>
+                  <a:srgbClr val="0070C0"/>
+                </a:solidFill>
+                <a:latin typeface="Microsoft JhengHei" pitchFamily="34" charset="-120"/>
+                <a:ea typeface="Microsoft JhengHei" pitchFamily="34" charset="-120"/>
               </a:rPr>
               <a:t>赦</a:t>
             </a:r>
             <a:r>
-              <a:rPr lang="zh-TW" altLang="en-US" sz="5400" b="1" dirty="0">
-                <a:solidFill>
-                  <a:srgbClr val="0070C0"/>
-                </a:solidFill>
+              <a:rPr lang="zh-TW" altLang="en-US" sz="4800" b="1" dirty="0">
+                <a:solidFill>
+                  <a:srgbClr val="0070C0"/>
+                </a:solidFill>
+                <a:latin typeface="Microsoft JhengHei" pitchFamily="34" charset="-120"/>
+                <a:ea typeface="Microsoft JhengHei" pitchFamily="34" charset="-120"/>
               </a:rPr>
               <a:t>罪恩白白賜</a:t>
             </a:r>
             <a:r>
-              <a:rPr lang="zh-TW" altLang="en-US" sz="5400" b="1" dirty="0" smtClean="0">
-                <a:solidFill>
-                  <a:srgbClr val="0070C0"/>
-                </a:solidFill>
+              <a:rPr lang="zh-TW" altLang="en-US" sz="4800" b="1" dirty="0">
+                <a:solidFill>
+                  <a:srgbClr val="0070C0"/>
+                </a:solidFill>
+                <a:latin typeface="Microsoft JhengHei" pitchFamily="34" charset="-120"/>
+                <a:ea typeface="Microsoft JhengHei" pitchFamily="34" charset="-120"/>
               </a:rPr>
               <a:t>我</a:t>
             </a:r>
-            <a:endParaRPr lang="en-US" altLang="zh-TW" sz="5400" b="1" dirty="0" smtClean="0">
+            <a:endParaRPr lang="en-US" altLang="zh-TW" sz="4800" b="1" dirty="0">
               <a:solidFill>
                 <a:srgbClr val="0070C0"/>
               </a:solidFill>
+              <a:latin typeface="Microsoft JhengHei" pitchFamily="34" charset="-120"/>
+              <a:ea typeface="Microsoft JhengHei" pitchFamily="34" charset="-120"/>
             </a:endParaRPr>
           </a:p>
           <a:p>
@@ -3588,33 +3691,41 @@
               <a:buNone/>
             </a:pPr>
             <a:r>
-              <a:rPr lang="zh-TW" altLang="en-US" sz="5400" b="1" dirty="0" smtClean="0">
-                <a:solidFill>
-                  <a:srgbClr val="0070C0"/>
-                </a:solidFill>
+              <a:rPr lang="zh-TW" altLang="en-US" sz="4800" b="1" dirty="0">
+                <a:solidFill>
+                  <a:srgbClr val="0070C0"/>
+                </a:solidFill>
+                <a:latin typeface="Microsoft JhengHei" pitchFamily="34" charset="-120"/>
+                <a:ea typeface="Microsoft JhengHei" pitchFamily="34" charset="-120"/>
               </a:rPr>
               <a:t>主</a:t>
             </a:r>
             <a:r>
-              <a:rPr lang="zh-TW" altLang="en-US" sz="5400" b="1" dirty="0">
-                <a:solidFill>
-                  <a:srgbClr val="0070C0"/>
-                </a:solidFill>
+              <a:rPr lang="zh-TW" altLang="en-US" sz="4800" b="1" dirty="0">
+                <a:solidFill>
+                  <a:srgbClr val="0070C0"/>
+                </a:solidFill>
+                <a:latin typeface="Microsoft JhengHei" pitchFamily="34" charset="-120"/>
+                <a:ea typeface="Microsoft JhengHei" pitchFamily="34" charset="-120"/>
               </a:rPr>
               <a:t>在我心裡且使我</a:t>
             </a:r>
             <a:r>
-              <a:rPr lang="zh-TW" altLang="en-US" sz="5400" b="1" dirty="0" smtClean="0">
-                <a:solidFill>
-                  <a:srgbClr val="0070C0"/>
-                </a:solidFill>
+              <a:rPr lang="zh-TW" altLang="en-US" sz="4800" b="1" dirty="0">
+                <a:solidFill>
+                  <a:srgbClr val="0070C0"/>
+                </a:solidFill>
+                <a:latin typeface="Microsoft JhengHei" pitchFamily="34" charset="-120"/>
+                <a:ea typeface="Microsoft JhengHei" pitchFamily="34" charset="-120"/>
               </a:rPr>
               <a:t>快樂</a:t>
             </a:r>
-            <a:endParaRPr lang="en-US" altLang="zh-TW" sz="5400" b="1" dirty="0" smtClean="0">
+            <a:endParaRPr lang="en-US" altLang="zh-TW" sz="4800" b="1" dirty="0">
               <a:solidFill>
                 <a:srgbClr val="0070C0"/>
               </a:solidFill>
+              <a:latin typeface="Microsoft JhengHei" pitchFamily="34" charset="-120"/>
+              <a:ea typeface="Microsoft JhengHei" pitchFamily="34" charset="-120"/>
             </a:endParaRPr>
           </a:p>
           <a:p>
@@ -3622,33 +3733,41 @@
               <a:buNone/>
             </a:pPr>
             <a:r>
-              <a:rPr lang="zh-TW" altLang="en-US" sz="5400" b="1" dirty="0" smtClean="0">
-                <a:solidFill>
-                  <a:srgbClr val="0070C0"/>
-                </a:solidFill>
+              <a:rPr lang="zh-TW" altLang="en-US" sz="4800" b="1" dirty="0">
+                <a:solidFill>
+                  <a:srgbClr val="0070C0"/>
+                </a:solidFill>
+                <a:latin typeface="Microsoft JhengHei" pitchFamily="34" charset="-120"/>
+                <a:ea typeface="Microsoft JhengHei" pitchFamily="34" charset="-120"/>
               </a:rPr>
               <a:t>今後</a:t>
             </a:r>
             <a:r>
-              <a:rPr lang="zh-TW" altLang="en-US" sz="5400" b="1" dirty="0">
-                <a:solidFill>
-                  <a:srgbClr val="0070C0"/>
-                </a:solidFill>
+              <a:rPr lang="zh-TW" altLang="en-US" sz="4800" b="1" dirty="0">
+                <a:solidFill>
+                  <a:srgbClr val="0070C0"/>
+                </a:solidFill>
+                <a:latin typeface="Microsoft JhengHei" pitchFamily="34" charset="-120"/>
+                <a:ea typeface="Microsoft JhengHei" pitchFamily="34" charset="-120"/>
               </a:rPr>
               <a:t>要唱凱旋</a:t>
             </a:r>
             <a:r>
-              <a:rPr lang="zh-TW" altLang="en-US" sz="5400" b="1" dirty="0" smtClean="0">
-                <a:solidFill>
-                  <a:srgbClr val="0070C0"/>
-                </a:solidFill>
+              <a:rPr lang="zh-TW" altLang="en-US" sz="4800" b="1" dirty="0">
+                <a:solidFill>
+                  <a:srgbClr val="0070C0"/>
+                </a:solidFill>
+                <a:latin typeface="Microsoft JhengHei" pitchFamily="34" charset="-120"/>
+                <a:ea typeface="Microsoft JhengHei" pitchFamily="34" charset="-120"/>
               </a:rPr>
               <a:t>歌</a:t>
             </a:r>
-            <a:endParaRPr lang="zh-TW" altLang="en-US" sz="5400" b="1" dirty="0">
+            <a:endParaRPr lang="zh-TW" altLang="en-US" sz="4800" b="1" dirty="0">
               <a:solidFill>
                 <a:srgbClr val="0070C0"/>
               </a:solidFill>
+              <a:latin typeface="Microsoft JhengHei" pitchFamily="34" charset="-120"/>
+              <a:ea typeface="Microsoft JhengHei" pitchFamily="34" charset="-120"/>
             </a:endParaRPr>
           </a:p>
         </p:txBody>
@@ -3690,14 +3809,18 @@
         </p:nvSpPr>
         <p:spPr/>
         <p:txBody>
-          <a:bodyPr/>
-          <a:lstStyle/>
-          <a:p>
-            <a:r>
-              <a:rPr lang="zh-TW" altLang="en-US" b="1" dirty="0">
-                <a:solidFill>
-                  <a:srgbClr val="0070C0"/>
-                </a:solidFill>
+          <a:bodyPr>
+            <a:normAutofit/>
+          </a:bodyPr>
+          <a:lstStyle/>
+          <a:p>
+            <a:r>
+              <a:rPr lang="zh-TW" altLang="en-US" sz="4000" b="1" dirty="0">
+                <a:solidFill>
+                  <a:srgbClr val="0070C0"/>
+                </a:solidFill>
+                <a:latin typeface="Microsoft JhengHei" pitchFamily="34" charset="-120"/>
+                <a:ea typeface="Microsoft JhengHei" pitchFamily="34" charset="-120"/>
               </a:rPr>
               <a:t>在我心裡常吟讚美歌</a:t>
             </a:r>
@@ -3716,8 +3839,8 @@
         </p:nvSpPr>
         <p:spPr>
           <a:xfrm>
-            <a:off x="457200" y="1600200"/>
-            <a:ext cx="8229600" cy="4900634"/>
+            <a:off x="0" y="1200150"/>
+            <a:ext cx="9144000" cy="3675476"/>
           </a:xfrm>
         </p:spPr>
         <p:txBody>
@@ -3730,25 +3853,31 @@
               <a:buNone/>
             </a:pPr>
             <a:r>
-              <a:rPr lang="zh-TW" altLang="en-US" sz="5400" b="1" dirty="0">
-                <a:solidFill>
-                  <a:srgbClr val="0070C0"/>
-                </a:solidFill>
+              <a:rPr lang="zh-TW" altLang="en-US" sz="4800" b="1" dirty="0">
+                <a:solidFill>
+                  <a:srgbClr val="0070C0"/>
+                </a:solidFill>
+                <a:latin typeface="Microsoft JhengHei" pitchFamily="34" charset="-120"/>
+                <a:ea typeface="Microsoft JhengHei" pitchFamily="34" charset="-120"/>
               </a:rPr>
               <a:t>在我心裡常吟</a:t>
             </a:r>
             <a:r>
-              <a:rPr lang="zh-TW" altLang="en-US" sz="5400" b="1" dirty="0" smtClean="0">
-                <a:solidFill>
-                  <a:srgbClr val="0070C0"/>
-                </a:solidFill>
+              <a:rPr lang="zh-TW" altLang="en-US" sz="4800" b="1" dirty="0">
+                <a:solidFill>
+                  <a:srgbClr val="0070C0"/>
+                </a:solidFill>
+                <a:latin typeface="Microsoft JhengHei" pitchFamily="34" charset="-120"/>
+                <a:ea typeface="Microsoft JhengHei" pitchFamily="34" charset="-120"/>
               </a:rPr>
               <a:t>讚美</a:t>
             </a:r>
-            <a:endParaRPr lang="en-US" altLang="zh-TW" sz="5400" b="1" dirty="0" smtClean="0">
+            <a:endParaRPr lang="en-US" altLang="zh-TW" sz="4800" b="1" dirty="0">
               <a:solidFill>
                 <a:srgbClr val="0070C0"/>
               </a:solidFill>
+              <a:latin typeface="Microsoft JhengHei" pitchFamily="34" charset="-120"/>
+              <a:ea typeface="Microsoft JhengHei" pitchFamily="34" charset="-120"/>
             </a:endParaRPr>
           </a:p>
           <a:p>
@@ -3756,41 +3885,51 @@
               <a:buNone/>
             </a:pPr>
             <a:r>
-              <a:rPr lang="zh-TW" altLang="en-US" sz="5400" b="1" dirty="0" smtClean="0">
-                <a:solidFill>
-                  <a:srgbClr val="0070C0"/>
-                </a:solidFill>
+              <a:rPr lang="zh-TW" altLang="en-US" sz="4800" b="1" dirty="0">
+                <a:solidFill>
+                  <a:srgbClr val="0070C0"/>
+                </a:solidFill>
+                <a:latin typeface="Microsoft JhengHei" pitchFamily="34" charset="-120"/>
+                <a:ea typeface="Microsoft JhengHei" pitchFamily="34" charset="-120"/>
               </a:rPr>
               <a:t>歌時常</a:t>
             </a:r>
             <a:r>
-              <a:rPr lang="zh-TW" altLang="en-US" sz="5400" b="1" dirty="0">
-                <a:solidFill>
-                  <a:srgbClr val="0070C0"/>
-                </a:solidFill>
+              <a:rPr lang="zh-TW" altLang="en-US" sz="4800" b="1" dirty="0">
+                <a:solidFill>
+                  <a:srgbClr val="0070C0"/>
+                </a:solidFill>
+                <a:latin typeface="Microsoft JhengHei" pitchFamily="34" charset="-120"/>
+                <a:ea typeface="Microsoft JhengHei" pitchFamily="34" charset="-120"/>
               </a:rPr>
               <a:t>吟奇妙</a:t>
             </a:r>
             <a:r>
-              <a:rPr lang="zh-TW" altLang="en-US" sz="5400" b="1" dirty="0" smtClean="0">
-                <a:solidFill>
-                  <a:srgbClr val="0070C0"/>
-                </a:solidFill>
+              <a:rPr lang="zh-TW" altLang="en-US" sz="4800" b="1" dirty="0">
+                <a:solidFill>
+                  <a:srgbClr val="0070C0"/>
+                </a:solidFill>
+                <a:latin typeface="Microsoft JhengHei" pitchFamily="34" charset="-120"/>
+                <a:ea typeface="Microsoft JhengHei" pitchFamily="34" charset="-120"/>
               </a:rPr>
               <a:t>歌</a:t>
             </a:r>
             <a:r>
-              <a:rPr lang="zh-TW" altLang="en-US" sz="5400" b="1" dirty="0">
-                <a:solidFill>
-                  <a:srgbClr val="0070C0"/>
-                </a:solidFill>
+              <a:rPr lang="zh-TW" altLang="en-US" sz="4800" b="1" dirty="0">
+                <a:solidFill>
+                  <a:srgbClr val="0070C0"/>
+                </a:solidFill>
+                <a:latin typeface="Microsoft JhengHei" pitchFamily="34" charset="-120"/>
+                <a:ea typeface="Microsoft JhengHei" pitchFamily="34" charset="-120"/>
               </a:rPr>
               <a:t>　　　</a:t>
             </a:r>
-            <a:endParaRPr lang="en-US" altLang="zh-TW" sz="5400" b="1" dirty="0" smtClean="0">
+            <a:endParaRPr lang="en-US" altLang="zh-TW" sz="4800" b="1" dirty="0">
               <a:solidFill>
                 <a:srgbClr val="0070C0"/>
               </a:solidFill>
+              <a:latin typeface="Microsoft JhengHei" pitchFamily="34" charset="-120"/>
+              <a:ea typeface="Microsoft JhengHei" pitchFamily="34" charset="-120"/>
             </a:endParaRPr>
           </a:p>
           <a:p>
@@ -3798,33 +3937,81 @@
               <a:buNone/>
             </a:pPr>
             <a:r>
-              <a:rPr lang="zh-TW" altLang="en-US" sz="5400" b="1" dirty="0" smtClean="0">
-                <a:solidFill>
-                  <a:srgbClr val="0070C0"/>
-                </a:solidFill>
+              <a:rPr lang="zh-TW" altLang="en-US" sz="4800" b="1" dirty="0">
+                <a:solidFill>
+                  <a:srgbClr val="0070C0"/>
+                </a:solidFill>
+                <a:latin typeface="Microsoft JhengHei" pitchFamily="34" charset="-120"/>
+                <a:ea typeface="Microsoft JhengHei" pitchFamily="34" charset="-120"/>
               </a:rPr>
               <a:t>像</a:t>
             </a:r>
             <a:r>
-              <a:rPr lang="zh-TW" altLang="en-US" sz="5400" b="1" dirty="0">
-                <a:solidFill>
-                  <a:srgbClr val="0070C0"/>
-                </a:solidFill>
+              <a:rPr lang="zh-TW" altLang="en-US" sz="4800" b="1" dirty="0">
+                <a:solidFill>
+                  <a:srgbClr val="0070C0"/>
+                </a:solidFill>
+                <a:latin typeface="Microsoft JhengHei" pitchFamily="34" charset="-120"/>
+                <a:ea typeface="Microsoft JhengHei" pitchFamily="34" charset="-120"/>
               </a:rPr>
               <a:t>天使同</a:t>
             </a:r>
             <a:r>
-              <a:rPr lang="zh-TW" altLang="en-US" sz="5400" b="1" dirty="0" smtClean="0">
-                <a:solidFill>
-                  <a:srgbClr val="0070C0"/>
-                </a:solidFill>
-              </a:rPr>
-              <a:t>唱和</a:t>
-            </a:r>
-            <a:endParaRPr lang="en-US" altLang="zh-TW" sz="5400" b="1" dirty="0" smtClean="0">
+              <a:rPr lang="zh-TW" altLang="en-US" sz="4800" b="1" dirty="0">
+                <a:solidFill>
+                  <a:srgbClr val="0070C0"/>
+                </a:solidFill>
+                <a:latin typeface="Microsoft JhengHei" pitchFamily="34" charset="-120"/>
+                <a:ea typeface="Microsoft JhengHei" pitchFamily="34" charset="-120"/>
+              </a:rPr>
+              <a:t>唱</a:t>
+            </a:r>
+            <a:r>
+              <a:rPr lang="zh-TW" altLang="en-US" sz="4800" b="1" dirty="0" smtClean="0">
+                <a:solidFill>
+                  <a:srgbClr val="0070C0"/>
+                </a:solidFill>
+                <a:latin typeface="Microsoft JhengHei" pitchFamily="34" charset="-120"/>
+                <a:ea typeface="Microsoft JhengHei" pitchFamily="34" charset="-120"/>
+              </a:rPr>
+              <a:t>和</a:t>
+            </a:r>
+            <a:r>
+              <a:rPr lang="en-US" altLang="zh-TW" sz="4800" b="1" dirty="0">
+                <a:solidFill>
+                  <a:srgbClr val="0070C0"/>
+                </a:solidFill>
+                <a:latin typeface="Microsoft JhengHei" pitchFamily="34" charset="-120"/>
+                <a:ea typeface="Microsoft JhengHei" pitchFamily="34" charset="-120"/>
+              </a:rPr>
+              <a:t> </a:t>
+            </a:r>
+            <a:r>
+              <a:rPr lang="en-US" altLang="zh-TW" sz="4800" b="1" dirty="0" smtClean="0">
+                <a:solidFill>
+                  <a:srgbClr val="0070C0"/>
+                </a:solidFill>
+                <a:latin typeface="Microsoft JhengHei" pitchFamily="34" charset="-120"/>
+                <a:ea typeface="Microsoft JhengHei" pitchFamily="34" charset="-120"/>
+              </a:rPr>
+              <a:t> </a:t>
+            </a:r>
+            <a:r>
+              <a:rPr lang="zh-TW" altLang="en-US" sz="4800" b="1" dirty="0" smtClean="0">
+                <a:solidFill>
+                  <a:srgbClr val="0070C0"/>
+                </a:solidFill>
+                <a:latin typeface="Microsoft JhengHei" pitchFamily="34" charset="-120"/>
+                <a:ea typeface="Microsoft JhengHei" pitchFamily="34" charset="-120"/>
+              </a:rPr>
+              <a:t>在我心裡常吟讚美</a:t>
+            </a:r>
+            <a:endParaRPr lang="en-US" altLang="zh-TW" sz="4800" b="1" dirty="0" smtClean="0">
               <a:solidFill>
                 <a:srgbClr val="0070C0"/>
               </a:solidFill>
+              <a:latin typeface="Microsoft JhengHei" pitchFamily="34" charset="-120"/>
+              <a:ea typeface="Microsoft JhengHei" pitchFamily="34" charset="-120"/>
             </a:endParaRPr>
           </a:p>
           <a:p>
@@ -3832,67 +4019,31 @@
               <a:buNone/>
             </a:pPr>
             <a:r>
-              <a:rPr lang="zh-TW" altLang="en-US" sz="5400" b="1" dirty="0" smtClean="0">
-                <a:solidFill>
-                  <a:srgbClr val="0070C0"/>
-                </a:solidFill>
-              </a:rPr>
-              <a:t>在</a:t>
-            </a:r>
-            <a:r>
-              <a:rPr lang="zh-TW" altLang="en-US" sz="5400" b="1" dirty="0">
-                <a:solidFill>
-                  <a:srgbClr val="0070C0"/>
-                </a:solidFill>
-              </a:rPr>
-              <a:t>我</a:t>
-            </a:r>
-            <a:r>
-              <a:rPr lang="zh-TW" altLang="en-US" sz="5400" b="1" dirty="0" smtClean="0">
-                <a:solidFill>
-                  <a:srgbClr val="0070C0"/>
-                </a:solidFill>
-              </a:rPr>
-              <a:t>心裡常</a:t>
-            </a:r>
-            <a:r>
-              <a:rPr lang="zh-TW" altLang="en-US" sz="5400" b="1" dirty="0">
-                <a:solidFill>
-                  <a:srgbClr val="0070C0"/>
-                </a:solidFill>
-              </a:rPr>
-              <a:t>吟</a:t>
-            </a:r>
-            <a:r>
-              <a:rPr lang="zh-TW" altLang="en-US" sz="5400" b="1" dirty="0" smtClean="0">
-                <a:solidFill>
-                  <a:srgbClr val="0070C0"/>
-                </a:solidFill>
-              </a:rPr>
-              <a:t>讚美</a:t>
-            </a:r>
-            <a:endParaRPr lang="en-US" altLang="zh-TW" sz="5400" b="1" dirty="0" smtClean="0">
+              <a:rPr lang="zh-TW" altLang="en-US" sz="4800" b="1" dirty="0" smtClean="0">
+                <a:solidFill>
+                  <a:srgbClr val="0070C0"/>
+                </a:solidFill>
+                <a:latin typeface="Microsoft JhengHei" pitchFamily="34" charset="-120"/>
+                <a:ea typeface="Microsoft JhengHei" pitchFamily="34" charset="-120"/>
+              </a:rPr>
+              <a:t>歌</a:t>
+            </a:r>
+            <a:r>
+              <a:rPr lang="zh-TW" altLang="en-US" sz="4800" b="1" dirty="0">
+                <a:solidFill>
+                  <a:srgbClr val="0070C0"/>
+                </a:solidFill>
+                <a:latin typeface="Microsoft JhengHei" pitchFamily="34" charset="-120"/>
+                <a:ea typeface="Microsoft JhengHei" pitchFamily="34" charset="-120"/>
+              </a:rPr>
+              <a:t>時常吟奇妙恩愛歌</a:t>
+            </a:r>
+            <a:endParaRPr lang="zh-TW" altLang="en-US" sz="4800" b="1" dirty="0">
               <a:solidFill>
                 <a:srgbClr val="0070C0"/>
               </a:solidFill>
-            </a:endParaRPr>
-          </a:p>
-          <a:p>
-            <a:pPr algn="ctr">
-              <a:buNone/>
-            </a:pPr>
-            <a:r>
-              <a:rPr lang="zh-TW" altLang="en-US" sz="5400" b="1" dirty="0" smtClean="0">
-                <a:solidFill>
-                  <a:srgbClr val="0070C0"/>
-                </a:solidFill>
-              </a:rPr>
-              <a:t>歌時常吟奇妙恩愛歌</a:t>
-            </a:r>
-            <a:endParaRPr lang="zh-TW" altLang="en-US" sz="5400" b="1" dirty="0">
-              <a:solidFill>
-                <a:srgbClr val="0070C0"/>
-              </a:solidFill>
+              <a:latin typeface="Microsoft JhengHei" pitchFamily="34" charset="-120"/>
+              <a:ea typeface="Microsoft JhengHei" pitchFamily="34" charset="-120"/>
             </a:endParaRPr>
           </a:p>
         </p:txBody>
@@ -3934,60 +4085,70 @@
         </p:nvSpPr>
         <p:spPr/>
         <p:txBody>
-          <a:bodyPr/>
-          <a:lstStyle/>
-          <a:p>
-            <a:r>
-              <a:rPr lang="zh-TW" altLang="en-US" b="1" dirty="0">
-                <a:solidFill>
-                  <a:srgbClr val="0070C0"/>
-                </a:solidFill>
-              </a:rPr>
-              <a:t>在我心裡常吟讚美歌</a:t>
-            </a:r>
-          </a:p>
-        </p:txBody>
-      </p:sp>
-      <p:sp>
-        <p:nvSpPr>
-          <p:cNvPr id="3" name="內容版面配置區 2"/>
-          <p:cNvSpPr>
-            <a:spLocks noGrp="1"/>
-          </p:cNvSpPr>
-          <p:nvPr>
-            <p:ph idx="1"/>
-          </p:nvPr>
-        </p:nvSpPr>
-        <p:spPr/>
-        <p:txBody>
-          <a:bodyPr anchor="ctr">
+          <a:bodyPr>
             <a:normAutofit/>
           </a:bodyPr>
           <a:lstStyle/>
           <a:p>
+            <a:r>
+              <a:rPr lang="zh-TW" altLang="en-US" sz="4000" b="1" dirty="0">
+                <a:solidFill>
+                  <a:srgbClr val="0070C0"/>
+                </a:solidFill>
+                <a:latin typeface="Microsoft JhengHei" pitchFamily="34" charset="-120"/>
+                <a:ea typeface="Microsoft JhengHei" pitchFamily="34" charset="-120"/>
+              </a:rPr>
+              <a:t>在我心裡常吟讚美歌</a:t>
+            </a:r>
+          </a:p>
+        </p:txBody>
+      </p:sp>
+      <p:sp>
+        <p:nvSpPr>
+          <p:cNvPr id="3" name="內容版面配置區 2"/>
+          <p:cNvSpPr>
+            <a:spLocks noGrp="1"/>
+          </p:cNvSpPr>
+          <p:nvPr>
+            <p:ph idx="1"/>
+          </p:nvPr>
+        </p:nvSpPr>
+        <p:spPr/>
+        <p:txBody>
+          <a:bodyPr anchor="ctr">
+            <a:noAutofit/>
+          </a:bodyPr>
+          <a:lstStyle/>
+          <a:p>
             <a:pPr algn="ctr">
               <a:buNone/>
             </a:pPr>
             <a:r>
-              <a:rPr lang="zh-TW" altLang="en-US" sz="5400" b="1" dirty="0">
-                <a:solidFill>
-                  <a:srgbClr val="0070C0"/>
-                </a:solidFill>
+              <a:rPr lang="zh-TW" altLang="en-US" sz="4800" b="1" dirty="0">
+                <a:solidFill>
+                  <a:srgbClr val="0070C0"/>
+                </a:solidFill>
+                <a:latin typeface="Microsoft JhengHei" pitchFamily="34" charset="-120"/>
+                <a:ea typeface="Microsoft JhengHei" pitchFamily="34" charset="-120"/>
               </a:rPr>
               <a:t>耶穌再來掌王權</a:t>
             </a:r>
             <a:r>
-              <a:rPr lang="zh-TW" altLang="en-US" sz="5400" b="1" dirty="0" smtClean="0">
-                <a:solidFill>
-                  <a:srgbClr val="0070C0"/>
-                </a:solidFill>
+              <a:rPr lang="zh-TW" altLang="en-US" sz="4800" b="1" dirty="0">
+                <a:solidFill>
+                  <a:srgbClr val="0070C0"/>
+                </a:solidFill>
+                <a:latin typeface="Microsoft JhengHei" pitchFamily="34" charset="-120"/>
+                <a:ea typeface="Microsoft JhengHei" pitchFamily="34" charset="-120"/>
               </a:rPr>
               <a:t>時候</a:t>
             </a:r>
-            <a:endParaRPr lang="en-US" altLang="zh-TW" sz="5400" b="1" dirty="0" smtClean="0">
+            <a:endParaRPr lang="en-US" altLang="zh-TW" sz="4800" b="1" dirty="0">
               <a:solidFill>
                 <a:srgbClr val="0070C0"/>
               </a:solidFill>
+              <a:latin typeface="Microsoft JhengHei" pitchFamily="34" charset="-120"/>
+              <a:ea typeface="Microsoft JhengHei" pitchFamily="34" charset="-120"/>
             </a:endParaRPr>
           </a:p>
           <a:p>
@@ -3995,33 +4156,41 @@
               <a:buNone/>
             </a:pPr>
             <a:r>
-              <a:rPr lang="zh-TW" altLang="en-US" sz="5400" b="1" dirty="0" smtClean="0">
-                <a:solidFill>
-                  <a:srgbClr val="0070C0"/>
-                </a:solidFill>
+              <a:rPr lang="zh-TW" altLang="en-US" sz="4800" b="1" dirty="0">
+                <a:solidFill>
+                  <a:srgbClr val="0070C0"/>
+                </a:solidFill>
+                <a:latin typeface="Microsoft JhengHei" pitchFamily="34" charset="-120"/>
+                <a:ea typeface="Microsoft JhengHei" pitchFamily="34" charset="-120"/>
               </a:rPr>
               <a:t>我</a:t>
             </a:r>
             <a:r>
-              <a:rPr lang="zh-TW" altLang="en-US" sz="5400" b="1" dirty="0">
-                <a:solidFill>
-                  <a:srgbClr val="0070C0"/>
-                </a:solidFill>
+              <a:rPr lang="zh-TW" altLang="en-US" sz="4800" b="1" dirty="0">
+                <a:solidFill>
+                  <a:srgbClr val="0070C0"/>
+                </a:solidFill>
+                <a:latin typeface="Microsoft JhengHei" pitchFamily="34" charset="-120"/>
+                <a:ea typeface="Microsoft JhengHei" pitchFamily="34" charset="-120"/>
               </a:rPr>
               <a:t>與天使同</a:t>
             </a:r>
             <a:r>
-              <a:rPr lang="zh-TW" altLang="en-US" sz="5400" b="1" dirty="0" smtClean="0">
-                <a:solidFill>
-                  <a:srgbClr val="0070C0"/>
-                </a:solidFill>
+              <a:rPr lang="zh-TW" altLang="en-US" sz="4800" b="1" dirty="0">
+                <a:solidFill>
+                  <a:srgbClr val="0070C0"/>
+                </a:solidFill>
+                <a:latin typeface="Microsoft JhengHei" pitchFamily="34" charset="-120"/>
+                <a:ea typeface="Microsoft JhengHei" pitchFamily="34" charset="-120"/>
               </a:rPr>
               <a:t>唱和</a:t>
             </a:r>
-            <a:endParaRPr lang="en-US" altLang="zh-TW" sz="5400" b="1" dirty="0" smtClean="0">
+            <a:endParaRPr lang="en-US" altLang="zh-TW" sz="4800" b="1" dirty="0">
               <a:solidFill>
                 <a:srgbClr val="0070C0"/>
               </a:solidFill>
+              <a:latin typeface="Microsoft JhengHei" pitchFamily="34" charset="-120"/>
+              <a:ea typeface="Microsoft JhengHei" pitchFamily="34" charset="-120"/>
             </a:endParaRPr>
           </a:p>
           <a:p>
@@ -4029,33 +4198,41 @@
               <a:buNone/>
             </a:pPr>
             <a:r>
-              <a:rPr lang="zh-TW" altLang="en-US" sz="5400" b="1" dirty="0" smtClean="0">
-                <a:solidFill>
-                  <a:srgbClr val="0070C0"/>
-                </a:solidFill>
+              <a:rPr lang="zh-TW" altLang="en-US" sz="4800" b="1" dirty="0">
+                <a:solidFill>
+                  <a:srgbClr val="0070C0"/>
+                </a:solidFill>
+                <a:latin typeface="Microsoft JhengHei" pitchFamily="34" charset="-120"/>
+                <a:ea typeface="Microsoft JhengHei" pitchFamily="34" charset="-120"/>
               </a:rPr>
               <a:t> </a:t>
             </a:r>
             <a:r>
-              <a:rPr lang="zh-TW" altLang="en-US" sz="5400" b="1" dirty="0">
-                <a:solidFill>
-                  <a:srgbClr val="0070C0"/>
-                </a:solidFill>
+              <a:rPr lang="zh-TW" altLang="en-US" sz="4800" b="1" dirty="0">
+                <a:solidFill>
+                  <a:srgbClr val="0070C0"/>
+                </a:solidFill>
+                <a:latin typeface="Microsoft JhengHei" pitchFamily="34" charset="-120"/>
+                <a:ea typeface="Microsoft JhengHei" pitchFamily="34" charset="-120"/>
               </a:rPr>
               <a:t>這時確有美妙音樂</a:t>
             </a:r>
             <a:r>
-              <a:rPr lang="zh-TW" altLang="en-US" sz="5400" b="1" dirty="0" smtClean="0">
-                <a:solidFill>
-                  <a:srgbClr val="0070C0"/>
-                </a:solidFill>
+              <a:rPr lang="zh-TW" altLang="en-US" sz="4800" b="1" dirty="0">
+                <a:solidFill>
+                  <a:srgbClr val="0070C0"/>
+                </a:solidFill>
+                <a:latin typeface="Microsoft JhengHei" pitchFamily="34" charset="-120"/>
+                <a:ea typeface="Microsoft JhengHei" pitchFamily="34" charset="-120"/>
               </a:rPr>
               <a:t>伴奏</a:t>
             </a:r>
-            <a:endParaRPr lang="en-US" altLang="zh-TW" sz="5400" b="1" dirty="0" smtClean="0">
+            <a:endParaRPr lang="en-US" altLang="zh-TW" sz="4800" b="1" dirty="0">
               <a:solidFill>
                 <a:srgbClr val="0070C0"/>
               </a:solidFill>
+              <a:latin typeface="Microsoft JhengHei" pitchFamily="34" charset="-120"/>
+              <a:ea typeface="Microsoft JhengHei" pitchFamily="34" charset="-120"/>
             </a:endParaRPr>
           </a:p>
           <a:p>
@@ -4063,33 +4240,41 @@
               <a:buNone/>
             </a:pPr>
             <a:r>
-              <a:rPr lang="zh-TW" altLang="en-US" sz="5400" b="1" dirty="0" smtClean="0">
-                <a:solidFill>
-                  <a:srgbClr val="0070C0"/>
-                </a:solidFill>
+              <a:rPr lang="zh-TW" altLang="en-US" sz="4800" b="1" dirty="0">
+                <a:solidFill>
+                  <a:srgbClr val="0070C0"/>
+                </a:solidFill>
+                <a:latin typeface="Microsoft JhengHei" pitchFamily="34" charset="-120"/>
+                <a:ea typeface="Microsoft JhengHei" pitchFamily="34" charset="-120"/>
               </a:rPr>
               <a:t>同</a:t>
             </a:r>
             <a:r>
-              <a:rPr lang="zh-TW" altLang="en-US" sz="5400" b="1" dirty="0">
-                <a:solidFill>
-                  <a:srgbClr val="0070C0"/>
-                </a:solidFill>
+              <a:rPr lang="zh-TW" altLang="en-US" sz="4800" b="1" dirty="0">
+                <a:solidFill>
+                  <a:srgbClr val="0070C0"/>
+                </a:solidFill>
+                <a:latin typeface="Microsoft JhengHei" pitchFamily="34" charset="-120"/>
+                <a:ea typeface="Microsoft JhengHei" pitchFamily="34" charset="-120"/>
               </a:rPr>
               <a:t>在寶座前</a:t>
             </a:r>
             <a:r>
-              <a:rPr lang="zh-TW" altLang="en-US" sz="5400" b="1" dirty="0" smtClean="0">
-                <a:solidFill>
-                  <a:srgbClr val="0070C0"/>
-                </a:solidFill>
+              <a:rPr lang="zh-TW" altLang="en-US" sz="4800" b="1" dirty="0">
+                <a:solidFill>
+                  <a:srgbClr val="0070C0"/>
+                </a:solidFill>
+                <a:latin typeface="Microsoft JhengHei" pitchFamily="34" charset="-120"/>
+                <a:ea typeface="Microsoft JhengHei" pitchFamily="34" charset="-120"/>
               </a:rPr>
               <a:t>唱歌</a:t>
             </a:r>
-            <a:endParaRPr lang="zh-TW" altLang="en-US" sz="5400" b="1" dirty="0">
+            <a:endParaRPr lang="zh-TW" altLang="en-US" sz="4800" b="1" dirty="0">
               <a:solidFill>
                 <a:srgbClr val="0070C0"/>
               </a:solidFill>
+              <a:latin typeface="Microsoft JhengHei" pitchFamily="34" charset="-120"/>
+              <a:ea typeface="Microsoft JhengHei" pitchFamily="34" charset="-120"/>
             </a:endParaRPr>
           </a:p>
         </p:txBody>
@@ -4131,14 +4316,18 @@
         </p:nvSpPr>
         <p:spPr/>
         <p:txBody>
-          <a:bodyPr/>
-          <a:lstStyle/>
-          <a:p>
-            <a:r>
-              <a:rPr lang="zh-TW" altLang="en-US" b="1" dirty="0">
-                <a:solidFill>
-                  <a:srgbClr val="0070C0"/>
-                </a:solidFill>
+          <a:bodyPr>
+            <a:normAutofit/>
+          </a:bodyPr>
+          <a:lstStyle/>
+          <a:p>
+            <a:r>
+              <a:rPr lang="zh-TW" altLang="en-US" sz="4000" b="1" dirty="0">
+                <a:solidFill>
+                  <a:srgbClr val="0070C0"/>
+                </a:solidFill>
+                <a:latin typeface="Microsoft JhengHei" pitchFamily="34" charset="-120"/>
+                <a:ea typeface="Microsoft JhengHei" pitchFamily="34" charset="-120"/>
               </a:rPr>
               <a:t>在我心裡常吟讚美歌</a:t>
             </a:r>
@@ -4157,8 +4346,8 @@
         </p:nvSpPr>
         <p:spPr>
           <a:xfrm>
-            <a:off x="457200" y="1600200"/>
-            <a:ext cx="8229600" cy="4900634"/>
+            <a:off x="0" y="1200150"/>
+            <a:ext cx="9144000" cy="3675476"/>
           </a:xfrm>
         </p:spPr>
         <p:txBody>
@@ -4171,25 +4360,31 @@
               <a:buNone/>
             </a:pPr>
             <a:r>
-              <a:rPr lang="zh-TW" altLang="en-US" sz="5400" b="1" dirty="0">
-                <a:solidFill>
-                  <a:srgbClr val="0070C0"/>
-                </a:solidFill>
+              <a:rPr lang="zh-TW" altLang="en-US" sz="4800" b="1" dirty="0">
+                <a:solidFill>
+                  <a:srgbClr val="0070C0"/>
+                </a:solidFill>
+                <a:latin typeface="Microsoft JhengHei" pitchFamily="34" charset="-120"/>
+                <a:ea typeface="Microsoft JhengHei" pitchFamily="34" charset="-120"/>
               </a:rPr>
               <a:t>在我心裡常吟</a:t>
             </a:r>
             <a:r>
-              <a:rPr lang="zh-TW" altLang="en-US" sz="5400" b="1" dirty="0" smtClean="0">
-                <a:solidFill>
-                  <a:srgbClr val="0070C0"/>
-                </a:solidFill>
+              <a:rPr lang="zh-TW" altLang="en-US" sz="4800" b="1" dirty="0">
+                <a:solidFill>
+                  <a:srgbClr val="0070C0"/>
+                </a:solidFill>
+                <a:latin typeface="Microsoft JhengHei" pitchFamily="34" charset="-120"/>
+                <a:ea typeface="Microsoft JhengHei" pitchFamily="34" charset="-120"/>
               </a:rPr>
               <a:t>讚美</a:t>
             </a:r>
-            <a:endParaRPr lang="en-US" altLang="zh-TW" sz="5400" b="1" dirty="0" smtClean="0">
+            <a:endParaRPr lang="en-US" altLang="zh-TW" sz="4800" b="1" dirty="0">
               <a:solidFill>
                 <a:srgbClr val="0070C0"/>
               </a:solidFill>
+              <a:latin typeface="Microsoft JhengHei" pitchFamily="34" charset="-120"/>
+              <a:ea typeface="Microsoft JhengHei" pitchFamily="34" charset="-120"/>
             </a:endParaRPr>
           </a:p>
           <a:p>
@@ -4197,41 +4392,51 @@
               <a:buNone/>
             </a:pPr>
             <a:r>
-              <a:rPr lang="zh-TW" altLang="en-US" sz="5400" b="1" dirty="0" smtClean="0">
-                <a:solidFill>
-                  <a:srgbClr val="0070C0"/>
-                </a:solidFill>
+              <a:rPr lang="zh-TW" altLang="en-US" sz="4800" b="1" dirty="0">
+                <a:solidFill>
+                  <a:srgbClr val="0070C0"/>
+                </a:solidFill>
+                <a:latin typeface="Microsoft JhengHei" pitchFamily="34" charset="-120"/>
+                <a:ea typeface="Microsoft JhengHei" pitchFamily="34" charset="-120"/>
               </a:rPr>
               <a:t>歌時常</a:t>
             </a:r>
             <a:r>
-              <a:rPr lang="zh-TW" altLang="en-US" sz="5400" b="1" dirty="0">
-                <a:solidFill>
-                  <a:srgbClr val="0070C0"/>
-                </a:solidFill>
+              <a:rPr lang="zh-TW" altLang="en-US" sz="4800" b="1" dirty="0">
+                <a:solidFill>
+                  <a:srgbClr val="0070C0"/>
+                </a:solidFill>
+                <a:latin typeface="Microsoft JhengHei" pitchFamily="34" charset="-120"/>
+                <a:ea typeface="Microsoft JhengHei" pitchFamily="34" charset="-120"/>
               </a:rPr>
               <a:t>吟奇妙</a:t>
             </a:r>
             <a:r>
-              <a:rPr lang="zh-TW" altLang="en-US" sz="5400" b="1" dirty="0" smtClean="0">
-                <a:solidFill>
-                  <a:srgbClr val="0070C0"/>
-                </a:solidFill>
+              <a:rPr lang="zh-TW" altLang="en-US" sz="4800" b="1" dirty="0">
+                <a:solidFill>
+                  <a:srgbClr val="0070C0"/>
+                </a:solidFill>
+                <a:latin typeface="Microsoft JhengHei" pitchFamily="34" charset="-120"/>
+                <a:ea typeface="Microsoft JhengHei" pitchFamily="34" charset="-120"/>
               </a:rPr>
               <a:t>歌</a:t>
             </a:r>
             <a:r>
-              <a:rPr lang="zh-TW" altLang="en-US" sz="5400" b="1" dirty="0">
-                <a:solidFill>
-                  <a:srgbClr val="0070C0"/>
-                </a:solidFill>
+              <a:rPr lang="zh-TW" altLang="en-US" sz="4800" b="1" dirty="0">
+                <a:solidFill>
+                  <a:srgbClr val="0070C0"/>
+                </a:solidFill>
+                <a:latin typeface="Microsoft JhengHei" pitchFamily="34" charset="-120"/>
+                <a:ea typeface="Microsoft JhengHei" pitchFamily="34" charset="-120"/>
               </a:rPr>
               <a:t>　　　</a:t>
             </a:r>
-            <a:endParaRPr lang="en-US" altLang="zh-TW" sz="5400" b="1" dirty="0" smtClean="0">
+            <a:endParaRPr lang="en-US" altLang="zh-TW" sz="4800" b="1" dirty="0">
               <a:solidFill>
                 <a:srgbClr val="0070C0"/>
               </a:solidFill>
+              <a:latin typeface="Microsoft JhengHei" pitchFamily="34" charset="-120"/>
+              <a:ea typeface="Microsoft JhengHei" pitchFamily="34" charset="-120"/>
             </a:endParaRPr>
           </a:p>
           <a:p>
@@ -4239,33 +4444,111 @@
               <a:buNone/>
             </a:pPr>
             <a:r>
-              <a:rPr lang="zh-TW" altLang="en-US" sz="5400" b="1" dirty="0" smtClean="0">
-                <a:solidFill>
-                  <a:srgbClr val="0070C0"/>
-                </a:solidFill>
+              <a:rPr lang="zh-TW" altLang="en-US" sz="4800" b="1" dirty="0">
+                <a:solidFill>
+                  <a:srgbClr val="0070C0"/>
+                </a:solidFill>
+                <a:latin typeface="Microsoft JhengHei" pitchFamily="34" charset="-120"/>
+                <a:ea typeface="Microsoft JhengHei" pitchFamily="34" charset="-120"/>
               </a:rPr>
               <a:t>像</a:t>
             </a:r>
             <a:r>
-              <a:rPr lang="zh-TW" altLang="en-US" sz="5400" b="1" dirty="0">
-                <a:solidFill>
-                  <a:srgbClr val="0070C0"/>
-                </a:solidFill>
+              <a:rPr lang="zh-TW" altLang="en-US" sz="4800" b="1" dirty="0">
+                <a:solidFill>
+                  <a:srgbClr val="0070C0"/>
+                </a:solidFill>
+                <a:latin typeface="Microsoft JhengHei" pitchFamily="34" charset="-120"/>
+                <a:ea typeface="Microsoft JhengHei" pitchFamily="34" charset="-120"/>
               </a:rPr>
               <a:t>天使同</a:t>
             </a:r>
             <a:r>
-              <a:rPr lang="zh-TW" altLang="en-US" sz="5400" b="1" dirty="0" smtClean="0">
-                <a:solidFill>
-                  <a:srgbClr val="0070C0"/>
-                </a:solidFill>
-              </a:rPr>
-              <a:t>唱和</a:t>
-            </a:r>
-            <a:endParaRPr lang="en-US" altLang="zh-TW" sz="5400" b="1" dirty="0" smtClean="0">
+              <a:rPr lang="zh-TW" altLang="en-US" sz="4800" b="1" dirty="0">
+                <a:solidFill>
+                  <a:srgbClr val="0070C0"/>
+                </a:solidFill>
+                <a:latin typeface="Microsoft JhengHei" pitchFamily="34" charset="-120"/>
+                <a:ea typeface="Microsoft JhengHei" pitchFamily="34" charset="-120"/>
+              </a:rPr>
+              <a:t>唱</a:t>
+            </a:r>
+            <a:r>
+              <a:rPr lang="zh-TW" altLang="en-US" sz="4800" b="1" dirty="0" smtClean="0">
+                <a:solidFill>
+                  <a:srgbClr val="0070C0"/>
+                </a:solidFill>
+                <a:latin typeface="Microsoft JhengHei" pitchFamily="34" charset="-120"/>
+                <a:ea typeface="Microsoft JhengHei" pitchFamily="34" charset="-120"/>
+              </a:rPr>
+              <a:t>和</a:t>
+            </a:r>
+            <a:r>
+              <a:rPr lang="en-US" altLang="zh-TW" sz="4800" b="1" dirty="0" smtClean="0">
+                <a:solidFill>
+                  <a:srgbClr val="0070C0"/>
+                </a:solidFill>
+                <a:latin typeface="Microsoft JhengHei" pitchFamily="34" charset="-120"/>
+                <a:ea typeface="Microsoft JhengHei" pitchFamily="34" charset="-120"/>
+              </a:rPr>
+              <a:t>  </a:t>
+            </a:r>
+            <a:r>
+              <a:rPr lang="zh-TW" altLang="en-US" sz="4800" b="1" dirty="0" smtClean="0">
+                <a:solidFill>
+                  <a:srgbClr val="0070C0"/>
+                </a:solidFill>
+                <a:latin typeface="Microsoft JhengHei" pitchFamily="34" charset="-120"/>
+                <a:ea typeface="Microsoft JhengHei" pitchFamily="34" charset="-120"/>
+              </a:rPr>
+              <a:t>在</a:t>
+            </a:r>
+            <a:r>
+              <a:rPr lang="zh-TW" altLang="en-US" sz="4800" b="1" dirty="0">
+                <a:solidFill>
+                  <a:srgbClr val="0070C0"/>
+                </a:solidFill>
+                <a:latin typeface="Microsoft JhengHei" pitchFamily="34" charset="-120"/>
+                <a:ea typeface="Microsoft JhengHei" pitchFamily="34" charset="-120"/>
+              </a:rPr>
+              <a:t>我</a:t>
+            </a:r>
+            <a:r>
+              <a:rPr lang="zh-TW" altLang="en-US" sz="4800" b="1" dirty="0">
+                <a:solidFill>
+                  <a:srgbClr val="0070C0"/>
+                </a:solidFill>
+                <a:latin typeface="Microsoft JhengHei" pitchFamily="34" charset="-120"/>
+                <a:ea typeface="Microsoft JhengHei" pitchFamily="34" charset="-120"/>
+              </a:rPr>
+              <a:t>心裡常</a:t>
+            </a:r>
+            <a:r>
+              <a:rPr lang="zh-TW" altLang="en-US" sz="4800" b="1" dirty="0">
+                <a:solidFill>
+                  <a:srgbClr val="0070C0"/>
+                </a:solidFill>
+                <a:latin typeface="Microsoft JhengHei" pitchFamily="34" charset="-120"/>
+                <a:ea typeface="Microsoft JhengHei" pitchFamily="34" charset="-120"/>
+              </a:rPr>
+              <a:t>吟</a:t>
+            </a:r>
+            <a:r>
+              <a:rPr lang="zh-TW" altLang="en-US" sz="4800" b="1" dirty="0">
+                <a:solidFill>
+                  <a:srgbClr val="0070C0"/>
+                </a:solidFill>
+                <a:latin typeface="Microsoft JhengHei" pitchFamily="34" charset="-120"/>
+                <a:ea typeface="Microsoft JhengHei" pitchFamily="34" charset="-120"/>
+              </a:rPr>
+              <a:t>讚美</a:t>
+            </a:r>
+            <a:endParaRPr lang="en-US" altLang="zh-TW" sz="4800" b="1" dirty="0">
               <a:solidFill>
                 <a:srgbClr val="0070C0"/>
               </a:solidFill>
+              <a:latin typeface="Microsoft JhengHei" pitchFamily="34" charset="-120"/>
+              <a:ea typeface="Microsoft JhengHei" pitchFamily="34" charset="-120"/>
             </a:endParaRPr>
           </a:p>
           <a:p>
@@ -4273,67 +4556,21 @@
               <a:buNone/>
             </a:pPr>
             <a:r>
-              <a:rPr lang="zh-TW" altLang="en-US" sz="5400" b="1" dirty="0" smtClean="0">
-                <a:solidFill>
-                  <a:srgbClr val="0070C0"/>
-                </a:solidFill>
-              </a:rPr>
-              <a:t>在</a:t>
-            </a:r>
-            <a:r>
-              <a:rPr lang="zh-TW" altLang="en-US" sz="5400" b="1" dirty="0">
-                <a:solidFill>
-                  <a:srgbClr val="0070C0"/>
-                </a:solidFill>
-              </a:rPr>
-              <a:t>我</a:t>
-            </a:r>
-            <a:r>
-              <a:rPr lang="zh-TW" altLang="en-US" sz="5400" b="1" dirty="0" smtClean="0">
-                <a:solidFill>
-                  <a:srgbClr val="0070C0"/>
-                </a:solidFill>
-              </a:rPr>
-              <a:t>心裡常</a:t>
-            </a:r>
-            <a:r>
-              <a:rPr lang="zh-TW" altLang="en-US" sz="5400" b="1" dirty="0">
-                <a:solidFill>
-                  <a:srgbClr val="0070C0"/>
-                </a:solidFill>
-              </a:rPr>
-              <a:t>吟</a:t>
-            </a:r>
-            <a:r>
-              <a:rPr lang="zh-TW" altLang="en-US" sz="5400" b="1" dirty="0" smtClean="0">
-                <a:solidFill>
-                  <a:srgbClr val="0070C0"/>
-                </a:solidFill>
-              </a:rPr>
-              <a:t>讚美</a:t>
-            </a:r>
-            <a:endParaRPr lang="en-US" altLang="zh-TW" sz="5400" b="1" dirty="0" smtClean="0">
+              <a:rPr lang="zh-TW" altLang="en-US" sz="4800" b="1" dirty="0">
+                <a:solidFill>
+                  <a:srgbClr val="0070C0"/>
+                </a:solidFill>
+                <a:latin typeface="Microsoft JhengHei" pitchFamily="34" charset="-120"/>
+                <a:ea typeface="Microsoft JhengHei" pitchFamily="34" charset="-120"/>
+              </a:rPr>
+              <a:t>歌時常吟奇妙恩愛歌</a:t>
+            </a:r>
+            <a:endParaRPr lang="zh-TW" altLang="en-US" sz="4800" b="1" dirty="0">
               <a:solidFill>
                 <a:srgbClr val="0070C0"/>
               </a:solidFill>
-            </a:endParaRPr>
-          </a:p>
-          <a:p>
-            <a:pPr algn="ctr">
-              <a:buNone/>
-            </a:pPr>
-            <a:r>
-              <a:rPr lang="zh-TW" altLang="en-US" sz="5400" b="1" dirty="0" smtClean="0">
-                <a:solidFill>
-                  <a:srgbClr val="0070C0"/>
-                </a:solidFill>
-              </a:rPr>
-              <a:t>歌時常吟奇妙恩愛歌</a:t>
-            </a:r>
-            <a:endParaRPr lang="zh-TW" altLang="en-US" sz="5400" b="1" dirty="0">
-              <a:solidFill>
-                <a:srgbClr val="0070C0"/>
-              </a:solidFill>
+              <a:latin typeface="Microsoft JhengHei" pitchFamily="34" charset="-120"/>
+              <a:ea typeface="Microsoft JhengHei" pitchFamily="34" charset="-120"/>
             </a:endParaRPr>
           </a:p>
         </p:txBody>
@@ -4347,7 +4584,7 @@
 </file>
 
 <file path=ppt/theme/theme1.xml><?xml version="1.0" encoding="utf-8"?>
-<a:theme xmlns:a="http://schemas.openxmlformats.org/drawingml/2006/main" name="Office 佈景主題">
+<a:theme xmlns:a="http://schemas.openxmlformats.org/drawingml/2006/main" name="Church Theme">
   <a:themeElements>
     <a:clrScheme name="Office">
       <a:dk1>

</xml_diff>